<commit_message>
Updated: Report, Presentation, Logo
</commit_message>
<xml_diff>
--- a/Presentation/PerformanceMonitorPresentation.pptx
+++ b/Presentation/PerformanceMonitorPresentation.pptx
@@ -15,6 +15,9 @@
     <p:sldId id="263" r:id="rId9"/>
     <p:sldId id="264" r:id="rId10"/>
     <p:sldId id="265" r:id="rId11"/>
+    <p:sldId id="266" r:id="rId12"/>
+    <p:sldId id="267" r:id="rId13"/>
+    <p:sldId id="268" r:id="rId14"/>
   </p:sldIdLst>
   <p:sldSz cx="12192000" cy="6858000"/>
   <p:notesSz cx="6858000" cy="9144000"/>
@@ -335,7 +338,7 @@
             <a:fld id="{B61BEF0D-F0BB-DE4B-95CE-6DB70DBA9567}" type="datetimeFigureOut">
               <a:rPr lang="en-US" smtClean="0"/>
               <a:pPr/>
-              <a:t>11/30/2015</a:t>
+              <a:t>12/5/2015</a:t>
             </a:fld>
             <a:endParaRPr lang="en-US" dirty="0"/>
           </a:p>
@@ -394,6 +397,18 @@
   <p:clrMapOvr>
     <a:masterClrMapping/>
   </p:clrMapOvr>
+  <mc:AlternateContent xmlns:mc="http://schemas.openxmlformats.org/markup-compatibility/2006" xmlns:p14="http://schemas.microsoft.com/office/powerpoint/2010/main">
+    <mc:Choice Requires="p14">
+      <p:transition spd="med" p14:dur="700">
+        <p:fade/>
+      </p:transition>
+    </mc:Choice>
+    <mc:Fallback xmlns="">
+      <p:transition spd="med">
+        <p:fade/>
+      </p:transition>
+    </mc:Fallback>
+  </mc:AlternateContent>
 </p:sldLayout>
 </file>
 
@@ -536,7 +551,7 @@
           </a:lstStyle>
           <a:p>
             <a:r>
-              <a:rPr lang="en-US" smtClean="0"/>
+              <a:rPr lang="en-US" dirty="0" smtClean="0"/>
               <a:t>Click icon to add picture</a:t>
             </a:r>
             <a:endParaRPr lang="en-US" dirty="0"/>
@@ -628,7 +643,7 @@
             <a:fld id="{B61BEF0D-F0BB-DE4B-95CE-6DB70DBA9567}" type="datetimeFigureOut">
               <a:rPr lang="en-US" smtClean="0"/>
               <a:pPr/>
-              <a:t>11/30/2015</a:t>
+              <a:t>12/5/2015</a:t>
             </a:fld>
             <a:endParaRPr lang="en-US" dirty="0"/>
           </a:p>
@@ -687,6 +702,18 @@
   <p:clrMapOvr>
     <a:masterClrMapping/>
   </p:clrMapOvr>
+  <mc:AlternateContent xmlns:mc="http://schemas.openxmlformats.org/markup-compatibility/2006" xmlns:p14="http://schemas.microsoft.com/office/powerpoint/2010/main">
+    <mc:Choice Requires="p14">
+      <p:transition spd="med" p14:dur="700">
+        <p:fade/>
+      </p:transition>
+    </mc:Choice>
+    <mc:Fallback xmlns="">
+      <p:transition spd="med">
+        <p:fade/>
+      </p:transition>
+    </mc:Fallback>
+  </mc:AlternateContent>
 </p:sldLayout>
 </file>
 
@@ -889,7 +916,7 @@
             <a:fld id="{B61BEF0D-F0BB-DE4B-95CE-6DB70DBA9567}" type="datetimeFigureOut">
               <a:rPr lang="en-US" smtClean="0"/>
               <a:pPr/>
-              <a:t>11/30/2015</a:t>
+              <a:t>12/5/2015</a:t>
             </a:fld>
             <a:endParaRPr lang="en-US" dirty="0"/>
           </a:p>
@@ -948,6 +975,18 @@
   <p:clrMapOvr>
     <a:masterClrMapping/>
   </p:clrMapOvr>
+  <mc:AlternateContent xmlns:mc="http://schemas.openxmlformats.org/markup-compatibility/2006" xmlns:p14="http://schemas.microsoft.com/office/powerpoint/2010/main">
+    <mc:Choice Requires="p14">
+      <p:transition spd="med" p14:dur="700">
+        <p:fade/>
+      </p:transition>
+    </mc:Choice>
+    <mc:Fallback xmlns="">
+      <p:transition spd="med">
+        <p:fade/>
+      </p:transition>
+    </mc:Fallback>
+  </mc:AlternateContent>
 </p:sldLayout>
 </file>
 
@@ -1360,7 +1399,7 @@
             <a:fld id="{B61BEF0D-F0BB-DE4B-95CE-6DB70DBA9567}" type="datetimeFigureOut">
               <a:rPr lang="en-US" smtClean="0"/>
               <a:pPr/>
-              <a:t>11/30/2015</a:t>
+              <a:t>12/5/2015</a:t>
             </a:fld>
             <a:endParaRPr lang="en-US" dirty="0"/>
           </a:p>
@@ -1419,6 +1458,18 @@
   <p:clrMapOvr>
     <a:masterClrMapping/>
   </p:clrMapOvr>
+  <mc:AlternateContent xmlns:mc="http://schemas.openxmlformats.org/markup-compatibility/2006" xmlns:p14="http://schemas.microsoft.com/office/powerpoint/2010/main">
+    <mc:Choice Requires="p14">
+      <p:transition spd="med" p14:dur="700">
+        <p:fade/>
+      </p:transition>
+    </mc:Choice>
+    <mc:Fallback xmlns="">
+      <p:transition spd="med">
+        <p:fade/>
+      </p:transition>
+    </mc:Fallback>
+  </mc:AlternateContent>
 </p:sldLayout>
 </file>
 
@@ -1542,7 +1593,7 @@
             <a:fld id="{B61BEF0D-F0BB-DE4B-95CE-6DB70DBA9567}" type="datetimeFigureOut">
               <a:rPr lang="en-US" smtClean="0"/>
               <a:pPr/>
-              <a:t>11/30/2015</a:t>
+              <a:t>12/5/2015</a:t>
             </a:fld>
             <a:endParaRPr lang="en-US" dirty="0"/>
           </a:p>
@@ -1601,6 +1652,18 @@
   <p:clrMapOvr>
     <a:masterClrMapping/>
   </p:clrMapOvr>
+  <mc:AlternateContent xmlns:mc="http://schemas.openxmlformats.org/markup-compatibility/2006" xmlns:p14="http://schemas.microsoft.com/office/powerpoint/2010/main">
+    <mc:Choice Requires="p14">
+      <p:transition spd="med" p14:dur="700">
+        <p:fade/>
+      </p:transition>
+    </mc:Choice>
+    <mc:Fallback xmlns="">
+      <p:transition spd="med">
+        <p:fade/>
+      </p:transition>
+    </mc:Fallback>
+  </mc:AlternateContent>
 </p:sldLayout>
 </file>
 
@@ -2120,7 +2183,7 @@
             <a:fld id="{B61BEF0D-F0BB-DE4B-95CE-6DB70DBA9567}" type="datetimeFigureOut">
               <a:rPr lang="en-US" smtClean="0"/>
               <a:pPr/>
-              <a:t>11/30/2015</a:t>
+              <a:t>12/5/2015</a:t>
             </a:fld>
             <a:endParaRPr lang="en-US" dirty="0"/>
           </a:p>
@@ -2179,6 +2242,18 @@
   <p:clrMapOvr>
     <a:masterClrMapping/>
   </p:clrMapOvr>
+  <mc:AlternateContent xmlns:mc="http://schemas.openxmlformats.org/markup-compatibility/2006" xmlns:p14="http://schemas.microsoft.com/office/powerpoint/2010/main">
+    <mc:Choice Requires="p14">
+      <p:transition spd="med" p14:dur="700">
+        <p:fade/>
+      </p:transition>
+    </mc:Choice>
+    <mc:Fallback xmlns="">
+      <p:transition spd="med">
+        <p:fade/>
+      </p:transition>
+    </mc:Fallback>
+  </mc:AlternateContent>
 </p:sldLayout>
 </file>
 
@@ -2454,7 +2529,7 @@
             <a:fld id="{B61BEF0D-F0BB-DE4B-95CE-6DB70DBA9567}" type="datetimeFigureOut">
               <a:rPr lang="en-US" smtClean="0"/>
               <a:pPr/>
-              <a:t>11/30/2015</a:t>
+              <a:t>12/5/2015</a:t>
             </a:fld>
             <a:endParaRPr lang="en-US" dirty="0"/>
           </a:p>
@@ -2513,6 +2588,18 @@
   <p:clrMapOvr>
     <a:masterClrMapping/>
   </p:clrMapOvr>
+  <mc:AlternateContent xmlns:mc="http://schemas.openxmlformats.org/markup-compatibility/2006" xmlns:p14="http://schemas.microsoft.com/office/powerpoint/2010/main">
+    <mc:Choice Requires="p14">
+      <p:transition spd="med" p14:dur="700">
+        <p:fade/>
+      </p:transition>
+    </mc:Choice>
+    <mc:Fallback xmlns="">
+      <p:transition spd="med">
+        <p:fade/>
+      </p:transition>
+    </mc:Fallback>
+  </mc:AlternateContent>
 </p:sldLayout>
 </file>
 
@@ -2631,7 +2718,7 @@
             <a:fld id="{B61BEF0D-F0BB-DE4B-95CE-6DB70DBA9567}" type="datetimeFigureOut">
               <a:rPr lang="en-US" smtClean="0"/>
               <a:pPr/>
-              <a:t>11/30/2015</a:t>
+              <a:t>12/5/2015</a:t>
             </a:fld>
             <a:endParaRPr lang="en-US" dirty="0"/>
           </a:p>
@@ -2690,6 +2777,18 @@
   <p:clrMapOvr>
     <a:masterClrMapping/>
   </p:clrMapOvr>
+  <mc:AlternateContent xmlns:mc="http://schemas.openxmlformats.org/markup-compatibility/2006" xmlns:p14="http://schemas.microsoft.com/office/powerpoint/2010/main">
+    <mc:Choice Requires="p14">
+      <p:transition spd="med" p14:dur="700">
+        <p:fade/>
+      </p:transition>
+    </mc:Choice>
+    <mc:Fallback xmlns="">
+      <p:transition spd="med">
+        <p:fade/>
+      </p:transition>
+    </mc:Fallback>
+  </mc:AlternateContent>
 </p:sldLayout>
 </file>
 
@@ -2813,7 +2912,7 @@
             <a:fld id="{B61BEF0D-F0BB-DE4B-95CE-6DB70DBA9567}" type="datetimeFigureOut">
               <a:rPr lang="en-US" smtClean="0"/>
               <a:pPr/>
-              <a:t>11/30/2015</a:t>
+              <a:t>12/5/2015</a:t>
             </a:fld>
             <a:endParaRPr lang="en-US" dirty="0"/>
           </a:p>
@@ -2872,6 +2971,18 @@
   <p:clrMapOvr>
     <a:masterClrMapping/>
   </p:clrMapOvr>
+  <mc:AlternateContent xmlns:mc="http://schemas.openxmlformats.org/markup-compatibility/2006" xmlns:p14="http://schemas.microsoft.com/office/powerpoint/2010/main">
+    <mc:Choice Requires="p14">
+      <p:transition spd="med" p14:dur="700">
+        <p:fade/>
+      </p:transition>
+    </mc:Choice>
+    <mc:Fallback xmlns="">
+      <p:transition spd="med">
+        <p:fade/>
+      </p:transition>
+    </mc:Fallback>
+  </mc:AlternateContent>
 </p:sldLayout>
 </file>
 
@@ -2985,7 +3096,7 @@
             <a:fld id="{B61BEF0D-F0BB-DE4B-95CE-6DB70DBA9567}" type="datetimeFigureOut">
               <a:rPr lang="en-US" smtClean="0"/>
               <a:pPr/>
-              <a:t>11/30/2015</a:t>
+              <a:t>12/5/2015</a:t>
             </a:fld>
             <a:endParaRPr lang="en-US" dirty="0"/>
           </a:p>
@@ -3044,6 +3155,18 @@
   <p:clrMapOvr>
     <a:masterClrMapping/>
   </p:clrMapOvr>
+  <mc:AlternateContent xmlns:mc="http://schemas.openxmlformats.org/markup-compatibility/2006" xmlns:p14="http://schemas.microsoft.com/office/powerpoint/2010/main">
+    <mc:Choice Requires="p14">
+      <p:transition spd="med" p14:dur="700">
+        <p:fade/>
+      </p:transition>
+    </mc:Choice>
+    <mc:Fallback xmlns="">
+      <p:transition spd="med">
+        <p:fade/>
+      </p:transition>
+    </mc:Fallback>
+  </mc:AlternateContent>
   <p:timing>
     <p:tnLst>
       <p:par>
@@ -3251,7 +3374,7 @@
             <a:fld id="{B61BEF0D-F0BB-DE4B-95CE-6DB70DBA9567}" type="datetimeFigureOut">
               <a:rPr lang="en-US" smtClean="0"/>
               <a:pPr/>
-              <a:t>11/30/2015</a:t>
+              <a:t>12/5/2015</a:t>
             </a:fld>
             <a:endParaRPr lang="en-US" dirty="0"/>
           </a:p>
@@ -3310,6 +3433,18 @@
   <p:clrMapOvr>
     <a:masterClrMapping/>
   </p:clrMapOvr>
+  <mc:AlternateContent xmlns:mc="http://schemas.openxmlformats.org/markup-compatibility/2006" xmlns:p14="http://schemas.microsoft.com/office/powerpoint/2010/main">
+    <mc:Choice Requires="p14">
+      <p:transition spd="med" p14:dur="700">
+        <p:fade/>
+      </p:transition>
+    </mc:Choice>
+    <mc:Fallback xmlns="">
+      <p:transition spd="med">
+        <p:fade/>
+      </p:transition>
+    </mc:Fallback>
+  </mc:AlternateContent>
   <p:timing>
     <p:tnLst>
       <p:par>
@@ -3552,7 +3687,7 @@
             <a:fld id="{B61BEF0D-F0BB-DE4B-95CE-6DB70DBA9567}" type="datetimeFigureOut">
               <a:rPr lang="en-US" smtClean="0"/>
               <a:pPr/>
-              <a:t>11/30/2015</a:t>
+              <a:t>12/5/2015</a:t>
             </a:fld>
             <a:endParaRPr lang="en-US" dirty="0"/>
           </a:p>
@@ -3611,6 +3746,18 @@
   <p:clrMapOvr>
     <a:masterClrMapping/>
   </p:clrMapOvr>
+  <mc:AlternateContent xmlns:mc="http://schemas.openxmlformats.org/markup-compatibility/2006" xmlns:p14="http://schemas.microsoft.com/office/powerpoint/2010/main">
+    <mc:Choice Requires="p14">
+      <p:transition spd="med" p14:dur="700">
+        <p:fade/>
+      </p:transition>
+    </mc:Choice>
+    <mc:Fallback xmlns="">
+      <p:transition spd="med">
+        <p:fade/>
+      </p:transition>
+    </mc:Fallback>
+  </mc:AlternateContent>
   <p:timing>
     <p:tnLst>
       <p:par>
@@ -3991,7 +4138,7 @@
             <a:fld id="{B61BEF0D-F0BB-DE4B-95CE-6DB70DBA9567}" type="datetimeFigureOut">
               <a:rPr lang="en-US" smtClean="0"/>
               <a:pPr/>
-              <a:t>11/30/2015</a:t>
+              <a:t>12/5/2015</a:t>
             </a:fld>
             <a:endParaRPr lang="en-US" dirty="0"/>
           </a:p>
@@ -4050,6 +4197,18 @@
   <p:clrMapOvr>
     <a:masterClrMapping/>
   </p:clrMapOvr>
+  <mc:AlternateContent xmlns:mc="http://schemas.openxmlformats.org/markup-compatibility/2006" xmlns:p14="http://schemas.microsoft.com/office/powerpoint/2010/main">
+    <mc:Choice Requires="p14">
+      <p:transition spd="med" p14:dur="700">
+        <p:fade/>
+      </p:transition>
+    </mc:Choice>
+    <mc:Fallback xmlns="">
+      <p:transition spd="med">
+        <p:fade/>
+      </p:transition>
+    </mc:Fallback>
+  </mc:AlternateContent>
 </p:sldLayout>
 </file>
 
@@ -4111,7 +4270,7 @@
             <a:fld id="{B61BEF0D-F0BB-DE4B-95CE-6DB70DBA9567}" type="datetimeFigureOut">
               <a:rPr lang="en-US" smtClean="0"/>
               <a:pPr/>
-              <a:t>11/30/2015</a:t>
+              <a:t>12/5/2015</a:t>
             </a:fld>
             <a:endParaRPr lang="en-US" dirty="0"/>
           </a:p>
@@ -4170,6 +4329,18 @@
   <p:clrMapOvr>
     <a:masterClrMapping/>
   </p:clrMapOvr>
+  <mc:AlternateContent xmlns:mc="http://schemas.openxmlformats.org/markup-compatibility/2006" xmlns:p14="http://schemas.microsoft.com/office/powerpoint/2010/main">
+    <mc:Choice Requires="p14">
+      <p:transition spd="med" p14:dur="700">
+        <p:fade/>
+      </p:transition>
+    </mc:Choice>
+    <mc:Fallback xmlns="">
+      <p:transition spd="med">
+        <p:fade/>
+      </p:transition>
+    </mc:Fallback>
+  </mc:AlternateContent>
 </p:sldLayout>
 </file>
 
@@ -4208,7 +4379,7 @@
             <a:fld id="{B61BEF0D-F0BB-DE4B-95CE-6DB70DBA9567}" type="datetimeFigureOut">
               <a:rPr lang="en-US" smtClean="0"/>
               <a:pPr/>
-              <a:t>11/30/2015</a:t>
+              <a:t>12/5/2015</a:t>
             </a:fld>
             <a:endParaRPr lang="en-US" dirty="0"/>
           </a:p>
@@ -4267,6 +4438,18 @@
   <p:clrMapOvr>
     <a:masterClrMapping/>
   </p:clrMapOvr>
+  <mc:AlternateContent xmlns:mc="http://schemas.openxmlformats.org/markup-compatibility/2006" xmlns:p14="http://schemas.microsoft.com/office/powerpoint/2010/main">
+    <mc:Choice Requires="p14">
+      <p:transition spd="med" p14:dur="700">
+        <p:fade/>
+      </p:transition>
+    </mc:Choice>
+    <mc:Fallback xmlns="">
+      <p:transition spd="med">
+        <p:fade/>
+      </p:transition>
+    </mc:Fallback>
+  </mc:AlternateContent>
 </p:sldLayout>
 </file>
 
@@ -4493,7 +4676,7 @@
             <a:fld id="{B61BEF0D-F0BB-DE4B-95CE-6DB70DBA9567}" type="datetimeFigureOut">
               <a:rPr lang="en-US" smtClean="0"/>
               <a:pPr/>
-              <a:t>11/30/2015</a:t>
+              <a:t>12/5/2015</a:t>
             </a:fld>
             <a:endParaRPr lang="en-US" dirty="0"/>
           </a:p>
@@ -4552,6 +4735,18 @@
   <p:clrMapOvr>
     <a:masterClrMapping/>
   </p:clrMapOvr>
+  <mc:AlternateContent xmlns:mc="http://schemas.openxmlformats.org/markup-compatibility/2006" xmlns:p14="http://schemas.microsoft.com/office/powerpoint/2010/main">
+    <mc:Choice Requires="p14">
+      <p:transition spd="med" p14:dur="700">
+        <p:fade/>
+      </p:transition>
+    </mc:Choice>
+    <mc:Fallback xmlns="">
+      <p:transition spd="med">
+        <p:fade/>
+      </p:transition>
+    </mc:Fallback>
+  </mc:AlternateContent>
 </p:sldLayout>
 </file>
 
@@ -4689,7 +4884,7 @@
           </a:lstStyle>
           <a:p>
             <a:r>
-              <a:rPr lang="en-US" smtClean="0"/>
+              <a:rPr lang="en-US" dirty="0" smtClean="0"/>
               <a:t>Click icon to add picture</a:t>
             </a:r>
             <a:endParaRPr lang="en-US" dirty="0"/>
@@ -4786,7 +4981,7 @@
             <a:fld id="{B61BEF0D-F0BB-DE4B-95CE-6DB70DBA9567}" type="datetimeFigureOut">
               <a:rPr lang="en-US" smtClean="0"/>
               <a:pPr/>
-              <a:t>11/30/2015</a:t>
+              <a:t>12/5/2015</a:t>
             </a:fld>
             <a:endParaRPr lang="en-US" dirty="0"/>
           </a:p>
@@ -4855,6 +5050,18 @@
   <p:clrMapOvr>
     <a:masterClrMapping/>
   </p:clrMapOvr>
+  <mc:AlternateContent xmlns:mc="http://schemas.openxmlformats.org/markup-compatibility/2006" xmlns:p14="http://schemas.microsoft.com/office/powerpoint/2010/main">
+    <mc:Choice Requires="p14">
+      <p:transition spd="med" p14:dur="700">
+        <p:fade/>
+      </p:transition>
+    </mc:Choice>
+    <mc:Fallback xmlns="">
+      <p:transition spd="med">
+        <p:fade/>
+      </p:transition>
+    </mc:Fallback>
+  </mc:AlternateContent>
 </p:sldLayout>
 </file>
 
@@ -5019,7 +5226,7 @@
             <a:fld id="{B61BEF0D-F0BB-DE4B-95CE-6DB70DBA9567}" type="datetimeFigureOut">
               <a:rPr lang="en-US" smtClean="0"/>
               <a:pPr/>
-              <a:t>11/30/2015</a:t>
+              <a:t>12/5/2015</a:t>
             </a:fld>
             <a:endParaRPr lang="en-US" dirty="0"/>
           </a:p>
@@ -5147,6 +5354,18 @@
     <p:sldLayoutId id="2147483696" r:id="rId16"/>
     <p:sldLayoutId id="2147483697" r:id="rId17"/>
   </p:sldLayoutIdLst>
+  <mc:AlternateContent xmlns:mc="http://schemas.openxmlformats.org/markup-compatibility/2006" xmlns:p14="http://schemas.microsoft.com/office/powerpoint/2010/main">
+    <mc:Choice Requires="p14">
+      <p:transition spd="med" p14:dur="700">
+        <p:fade/>
+      </p:transition>
+    </mc:Choice>
+    <mc:Fallback xmlns="">
+      <p:transition spd="med">
+        <p:fade/>
+      </p:transition>
+    </mc:Fallback>
+  </mc:AlternateContent>
   <p:txStyles>
     <p:titleStyle>
       <a:lvl1pPr algn="l" defTabSz="457200" rtl="0" eaLnBrk="1" latinLnBrk="0" hangingPunct="1">
@@ -5802,7 +6021,7 @@
         <p:spPr>
           <a:xfrm>
             <a:off x="1751012" y="0"/>
-            <a:ext cx="8676222" cy="3200400"/>
+            <a:ext cx="8676222" cy="1565189"/>
           </a:xfrm>
         </p:spPr>
         <p:txBody>
@@ -5834,56 +6053,42 @@
           <a:p>
             <a:r>
               <a:rPr lang="en-GB" dirty="0" smtClean="0"/>
-              <a:t>Group 2 – </a:t>
-            </a:r>
-            <a:r>
-              <a:rPr lang="en-GB" dirty="0" err="1" smtClean="0"/>
-              <a:t>Abubaker</a:t>
-            </a:r>
-            <a:r>
-              <a:rPr lang="en-GB" dirty="0" smtClean="0"/>
-              <a:t> </a:t>
-            </a:r>
-            <a:r>
-              <a:rPr lang="en-GB" dirty="0" err="1" smtClean="0"/>
-              <a:t>Egeh</a:t>
-            </a:r>
-            <a:r>
-              <a:rPr lang="en-GB" dirty="0" smtClean="0"/>
-              <a:t>, Harsh </a:t>
-            </a:r>
-            <a:r>
-              <a:rPr lang="en-GB" dirty="0" err="1" smtClean="0"/>
-              <a:t>Dhanwani</a:t>
-            </a:r>
-            <a:r>
-              <a:rPr lang="en-GB" dirty="0" smtClean="0"/>
-              <a:t>, Martin </a:t>
-            </a:r>
-            <a:r>
-              <a:rPr lang="en-GB" dirty="0" err="1" smtClean="0"/>
-              <a:t>Kukura</a:t>
-            </a:r>
-            <a:r>
-              <a:rPr lang="en-GB" dirty="0" smtClean="0"/>
-              <a:t>, Niral Mehta, </a:t>
-            </a:r>
-            <a:r>
-              <a:rPr lang="en-GB" dirty="0" err="1" smtClean="0"/>
-              <a:t>Romina</a:t>
-            </a:r>
-            <a:r>
-              <a:rPr lang="en-GB" dirty="0" smtClean="0"/>
-              <a:t> </a:t>
-            </a:r>
-            <a:r>
-              <a:rPr lang="en-GB" smtClean="0"/>
-              <a:t>Gnanavel</a:t>
+              <a:t>Group 2 – Abubaker Egeh, Harsh Dhanwani, Martin Kukura, Niral Mehta, Romina Gnanavel, Tulga Sukhtorj</a:t>
             </a:r>
             <a:endParaRPr lang="en-GB" dirty="0"/>
           </a:p>
         </p:txBody>
       </p:sp>
+      <p:pic>
+        <p:nvPicPr>
+          <p:cNvPr id="5" name="Picture 4"/>
+          <p:cNvPicPr>
+            <a:picLocks noChangeAspect="1"/>
+          </p:cNvPicPr>
+          <p:nvPr/>
+        </p:nvPicPr>
+        <p:blipFill>
+          <a:blip r:embed="rId2">
+            <a:extLst>
+              <a:ext uri="{28A0092B-C50C-407E-A947-70E740481C1C}">
+                <a14:useLocalDpi xmlns:a14="http://schemas.microsoft.com/office/drawing/2010/main" val="0"/>
+              </a:ext>
+            </a:extLst>
+          </a:blip>
+          <a:stretch>
+            <a:fillRect/>
+          </a:stretch>
+        </p:blipFill>
+        <p:spPr>
+          <a:xfrm>
+            <a:off x="5135594" y="1565189"/>
+            <a:ext cx="1907058" cy="1907058"/>
+          </a:xfrm>
+          <a:prstGeom prst="rect">
+            <a:avLst/>
+          </a:prstGeom>
+        </p:spPr>
+      </p:pic>
     </p:spTree>
     <p:extLst>
       <p:ext uri="{BB962C8B-B14F-4D97-AF65-F5344CB8AC3E}">
@@ -5894,6 +6099,18 @@
   <p:clrMapOvr>
     <a:masterClrMapping/>
   </p:clrMapOvr>
+  <mc:AlternateContent xmlns:mc="http://schemas.openxmlformats.org/markup-compatibility/2006" xmlns:p14="http://schemas.microsoft.com/office/powerpoint/2010/main">
+    <mc:Choice Requires="p14">
+      <p:transition spd="med" p14:dur="700">
+        <p:fade/>
+      </p:transition>
+    </mc:Choice>
+    <mc:Fallback xmlns="">
+      <p:transition spd="med">
+        <p:fade/>
+      </p:transition>
+    </mc:Fallback>
+  </mc:AlternateContent>
   <p:timing>
     <p:tnLst>
       <p:par>
@@ -5931,18 +6148,88 @@
             <p:ph type="title"/>
           </p:nvPr>
         </p:nvSpPr>
-        <p:spPr/>
+        <p:spPr>
+          <a:xfrm>
+            <a:off x="1141413" y="101603"/>
+            <a:ext cx="9905998" cy="864973"/>
+          </a:xfrm>
+        </p:spPr>
         <p:txBody>
           <a:bodyPr/>
           <a:lstStyle/>
           <a:p>
-            <a:endParaRPr lang="en-GB"/>
-          </a:p>
-        </p:txBody>
-      </p:sp>
-      <p:sp>
-        <p:nvSpPr>
-          <p:cNvPr id="3" name="Content Placeholder 2"/>
+            <a:pPr algn="ctr"/>
+            <a:r>
+              <a:rPr lang="en-GB" dirty="0" smtClean="0"/>
+              <a:t>Design – Standard Users</a:t>
+            </a:r>
+            <a:endParaRPr lang="en-GB" dirty="0"/>
+          </a:p>
+        </p:txBody>
+      </p:sp>
+      <p:pic>
+        <p:nvPicPr>
+          <p:cNvPr id="5" name="Picture 4"/>
+          <p:cNvPicPr>
+            <a:picLocks noChangeAspect="1"/>
+          </p:cNvPicPr>
+          <p:nvPr/>
+        </p:nvPicPr>
+        <p:blipFill>
+          <a:blip r:embed="rId2">
+            <a:extLst>
+              <a:ext uri="{28A0092B-C50C-407E-A947-70E740481C1C}">
+                <a14:useLocalDpi xmlns:a14="http://schemas.microsoft.com/office/drawing/2010/main" val="0"/>
+              </a:ext>
+            </a:extLst>
+          </a:blip>
+          <a:stretch>
+            <a:fillRect/>
+          </a:stretch>
+        </p:blipFill>
+        <p:spPr>
+          <a:xfrm>
+            <a:off x="460581" y="2196698"/>
+            <a:ext cx="5379831" cy="3026155"/>
+          </a:xfrm>
+          <a:prstGeom prst="rect">
+            <a:avLst/>
+          </a:prstGeom>
+        </p:spPr>
+      </p:pic>
+      <p:pic>
+        <p:nvPicPr>
+          <p:cNvPr id="6" name="Picture 5"/>
+          <p:cNvPicPr>
+            <a:picLocks noChangeAspect="1"/>
+          </p:cNvPicPr>
+          <p:nvPr/>
+        </p:nvPicPr>
+        <p:blipFill>
+          <a:blip r:embed="rId3">
+            <a:extLst>
+              <a:ext uri="{28A0092B-C50C-407E-A947-70E740481C1C}">
+                <a14:useLocalDpi xmlns:a14="http://schemas.microsoft.com/office/drawing/2010/main" val="0"/>
+              </a:ext>
+            </a:extLst>
+          </a:blip>
+          <a:stretch>
+            <a:fillRect/>
+          </a:stretch>
+        </p:blipFill>
+        <p:spPr>
+          <a:xfrm>
+            <a:off x="6263745" y="2196698"/>
+            <a:ext cx="5379831" cy="3026155"/>
+          </a:xfrm>
+          <a:prstGeom prst="rect">
+            <a:avLst/>
+          </a:prstGeom>
+        </p:spPr>
+      </p:pic>
+      <p:sp>
+        <p:nvSpPr>
+          <p:cNvPr id="7" name="Content Placeholder 2"/>
           <p:cNvSpPr>
             <a:spLocks noGrp="1"/>
           </p:cNvSpPr>
@@ -5950,25 +6237,2488 @@
             <p:ph idx="1"/>
           </p:nvPr>
         </p:nvSpPr>
-        <p:spPr/>
+        <p:spPr>
+          <a:xfrm>
+            <a:off x="734057" y="1242282"/>
+            <a:ext cx="4832878" cy="678709"/>
+          </a:xfrm>
+        </p:spPr>
         <p:txBody>
           <a:bodyPr/>
           <a:lstStyle/>
           <a:p>
-            <a:endParaRPr lang="en-GB"/>
+            <a:pPr marL="0" indent="0" algn="ctr">
+              <a:buNone/>
+            </a:pPr>
+            <a:r>
+              <a:rPr lang="en-GB" dirty="0" smtClean="0"/>
+              <a:t>System overview</a:t>
+            </a:r>
+            <a:endParaRPr lang="en-GB" dirty="0"/>
+          </a:p>
+        </p:txBody>
+      </p:sp>
+      <p:sp>
+        <p:nvSpPr>
+          <p:cNvPr id="8" name="Content Placeholder 2"/>
+          <p:cNvSpPr txBox="1">
+            <a:spLocks/>
+          </p:cNvSpPr>
+          <p:nvPr/>
+        </p:nvSpPr>
+        <p:spPr>
+          <a:xfrm>
+            <a:off x="6537221" y="1242282"/>
+            <a:ext cx="4832878" cy="678709"/>
+          </a:xfrm>
+          <a:prstGeom prst="rect">
+            <a:avLst/>
+          </a:prstGeom>
+        </p:spPr>
+        <p:txBody>
+          <a:bodyPr vert="horz" lIns="91440" tIns="45720" rIns="91440" bIns="45720" rtlCol="0" anchor="ctr">
+            <a:normAutofit/>
+          </a:bodyPr>
+          <a:lstStyle>
+            <a:lvl1pPr marL="285750" indent="-285750" algn="l" defTabSz="457200" rtl="0" eaLnBrk="1" latinLnBrk="0" hangingPunct="1">
+              <a:spcBef>
+                <a:spcPct val="20000"/>
+              </a:spcBef>
+              <a:spcAft>
+                <a:spcPts val="600"/>
+              </a:spcAft>
+              <a:buClr>
+                <a:schemeClr val="tx1"/>
+              </a:buClr>
+              <a:buSzPct val="100000"/>
+              <a:buFont typeface="Arial"/>
+              <a:buChar char="•"/>
+              <a:defRPr sz="2000" kern="1200" cap="small">
+                <a:gradFill flip="none" rotWithShape="1">
+                  <a:gsLst>
+                    <a:gs pos="0">
+                      <a:schemeClr val="tx1"/>
+                    </a:gs>
+                    <a:gs pos="100000">
+                      <a:schemeClr val="tx1">
+                        <a:lumMod val="75000"/>
+                      </a:schemeClr>
+                    </a:gs>
+                  </a:gsLst>
+                  <a:lin ang="5580000" scaled="0"/>
+                  <a:tileRect/>
+                </a:gradFill>
+                <a:effectLst>
+                  <a:glow rad="38100">
+                    <a:schemeClr val="bg1">
+                      <a:lumMod val="50000"/>
+                      <a:lumOff val="50000"/>
+                      <a:alpha val="20000"/>
+                    </a:schemeClr>
+                  </a:glow>
+                  <a:outerShdw blurRad="44450" dist="12700" dir="13860000" algn="tl" rotWithShape="0">
+                    <a:srgbClr val="000000">
+                      <a:alpha val="20000"/>
+                    </a:srgbClr>
+                  </a:outerShdw>
+                </a:effectLst>
+                <a:latin typeface="+mn-lt"/>
+                <a:ea typeface="+mn-ea"/>
+                <a:cs typeface="+mn-cs"/>
+              </a:defRPr>
+            </a:lvl1pPr>
+            <a:lvl2pPr marL="742950" indent="-285750" algn="l" defTabSz="457200" rtl="0" eaLnBrk="1" latinLnBrk="0" hangingPunct="1">
+              <a:spcBef>
+                <a:spcPct val="20000"/>
+              </a:spcBef>
+              <a:spcAft>
+                <a:spcPts val="600"/>
+              </a:spcAft>
+              <a:buClr>
+                <a:schemeClr val="tx1"/>
+              </a:buClr>
+              <a:buSzPct val="100000"/>
+              <a:buFont typeface="Arial"/>
+              <a:buChar char="•"/>
+              <a:defRPr sz="1800" kern="1200" cap="small">
+                <a:gradFill flip="none" rotWithShape="1">
+                  <a:gsLst>
+                    <a:gs pos="0">
+                      <a:schemeClr val="tx1"/>
+                    </a:gs>
+                    <a:gs pos="100000">
+                      <a:schemeClr val="tx1">
+                        <a:lumMod val="75000"/>
+                      </a:schemeClr>
+                    </a:gs>
+                  </a:gsLst>
+                  <a:lin ang="5580000" scaled="0"/>
+                  <a:tileRect/>
+                </a:gradFill>
+                <a:effectLst>
+                  <a:glow rad="38100">
+                    <a:schemeClr val="bg1">
+                      <a:lumMod val="50000"/>
+                      <a:lumOff val="50000"/>
+                      <a:alpha val="20000"/>
+                    </a:schemeClr>
+                  </a:glow>
+                  <a:outerShdw blurRad="44450" dist="12700" dir="13860000" algn="tl" rotWithShape="0">
+                    <a:srgbClr val="000000">
+                      <a:alpha val="20000"/>
+                    </a:srgbClr>
+                  </a:outerShdw>
+                </a:effectLst>
+                <a:latin typeface="+mn-lt"/>
+                <a:ea typeface="+mn-ea"/>
+                <a:cs typeface="+mn-cs"/>
+              </a:defRPr>
+            </a:lvl2pPr>
+            <a:lvl3pPr marL="1200150" indent="-285750" algn="l" defTabSz="457200" rtl="0" eaLnBrk="1" latinLnBrk="0" hangingPunct="1">
+              <a:spcBef>
+                <a:spcPct val="20000"/>
+              </a:spcBef>
+              <a:spcAft>
+                <a:spcPts val="600"/>
+              </a:spcAft>
+              <a:buClr>
+                <a:schemeClr val="tx1"/>
+              </a:buClr>
+              <a:buSzPct val="100000"/>
+              <a:buFont typeface="Arial"/>
+              <a:buChar char="•"/>
+              <a:defRPr sz="1600" kern="1200" cap="small">
+                <a:gradFill flip="none" rotWithShape="1">
+                  <a:gsLst>
+                    <a:gs pos="0">
+                      <a:schemeClr val="tx1"/>
+                    </a:gs>
+                    <a:gs pos="100000">
+                      <a:schemeClr val="tx1">
+                        <a:lumMod val="75000"/>
+                      </a:schemeClr>
+                    </a:gs>
+                  </a:gsLst>
+                  <a:lin ang="5580000" scaled="0"/>
+                  <a:tileRect/>
+                </a:gradFill>
+                <a:effectLst>
+                  <a:glow rad="38100">
+                    <a:schemeClr val="bg1">
+                      <a:lumMod val="50000"/>
+                      <a:lumOff val="50000"/>
+                      <a:alpha val="20000"/>
+                    </a:schemeClr>
+                  </a:glow>
+                  <a:outerShdw blurRad="44450" dist="12700" dir="13860000" algn="tl" rotWithShape="0">
+                    <a:srgbClr val="000000">
+                      <a:alpha val="20000"/>
+                    </a:srgbClr>
+                  </a:outerShdw>
+                </a:effectLst>
+                <a:latin typeface="+mn-lt"/>
+                <a:ea typeface="+mn-ea"/>
+                <a:cs typeface="+mn-cs"/>
+              </a:defRPr>
+            </a:lvl3pPr>
+            <a:lvl4pPr marL="1543050" indent="-171450" algn="l" defTabSz="457200" rtl="0" eaLnBrk="1" latinLnBrk="0" hangingPunct="1">
+              <a:spcBef>
+                <a:spcPct val="20000"/>
+              </a:spcBef>
+              <a:spcAft>
+                <a:spcPts val="600"/>
+              </a:spcAft>
+              <a:buClr>
+                <a:schemeClr val="tx1"/>
+              </a:buClr>
+              <a:buSzPct val="100000"/>
+              <a:buFont typeface="Arial"/>
+              <a:buChar char="•"/>
+              <a:defRPr sz="1400" kern="1200" cap="small">
+                <a:gradFill flip="none" rotWithShape="1">
+                  <a:gsLst>
+                    <a:gs pos="0">
+                      <a:schemeClr val="tx1"/>
+                    </a:gs>
+                    <a:gs pos="100000">
+                      <a:schemeClr val="tx1">
+                        <a:lumMod val="75000"/>
+                      </a:schemeClr>
+                    </a:gs>
+                  </a:gsLst>
+                  <a:lin ang="5580000" scaled="0"/>
+                  <a:tileRect/>
+                </a:gradFill>
+                <a:effectLst>
+                  <a:glow rad="38100">
+                    <a:schemeClr val="bg1">
+                      <a:lumMod val="50000"/>
+                      <a:lumOff val="50000"/>
+                      <a:alpha val="20000"/>
+                    </a:schemeClr>
+                  </a:glow>
+                  <a:outerShdw blurRad="44450" dist="12700" dir="13860000" algn="tl" rotWithShape="0">
+                    <a:srgbClr val="000000">
+                      <a:alpha val="20000"/>
+                    </a:srgbClr>
+                  </a:outerShdw>
+                </a:effectLst>
+                <a:latin typeface="+mn-lt"/>
+                <a:ea typeface="+mn-ea"/>
+                <a:cs typeface="+mn-cs"/>
+              </a:defRPr>
+            </a:lvl4pPr>
+            <a:lvl5pPr marL="2000250" indent="-171450" algn="l" defTabSz="457200" rtl="0" eaLnBrk="1" latinLnBrk="0" hangingPunct="1">
+              <a:spcBef>
+                <a:spcPct val="20000"/>
+              </a:spcBef>
+              <a:spcAft>
+                <a:spcPts val="600"/>
+              </a:spcAft>
+              <a:buClr>
+                <a:schemeClr val="tx1"/>
+              </a:buClr>
+              <a:buSzPct val="100000"/>
+              <a:buFont typeface="Arial"/>
+              <a:buChar char="•"/>
+              <a:defRPr sz="1400" kern="1200" cap="small">
+                <a:gradFill flip="none" rotWithShape="1">
+                  <a:gsLst>
+                    <a:gs pos="0">
+                      <a:schemeClr val="tx1"/>
+                    </a:gs>
+                    <a:gs pos="100000">
+                      <a:schemeClr val="tx1">
+                        <a:lumMod val="75000"/>
+                      </a:schemeClr>
+                    </a:gs>
+                  </a:gsLst>
+                  <a:lin ang="5580000" scaled="0"/>
+                  <a:tileRect/>
+                </a:gradFill>
+                <a:effectLst>
+                  <a:glow rad="38100">
+                    <a:schemeClr val="bg1">
+                      <a:lumMod val="50000"/>
+                      <a:lumOff val="50000"/>
+                      <a:alpha val="20000"/>
+                    </a:schemeClr>
+                  </a:glow>
+                  <a:outerShdw blurRad="44450" dist="12700" dir="13860000" algn="tl" rotWithShape="0">
+                    <a:srgbClr val="000000">
+                      <a:alpha val="20000"/>
+                    </a:srgbClr>
+                  </a:outerShdw>
+                </a:effectLst>
+                <a:latin typeface="+mn-lt"/>
+                <a:ea typeface="+mn-ea"/>
+                <a:cs typeface="+mn-cs"/>
+              </a:defRPr>
+            </a:lvl5pPr>
+            <a:lvl6pPr marL="2514600" indent="-228600" algn="l" defTabSz="457200" rtl="0" eaLnBrk="1" latinLnBrk="0" hangingPunct="1">
+              <a:spcBef>
+                <a:spcPct val="20000"/>
+              </a:spcBef>
+              <a:spcAft>
+                <a:spcPts val="600"/>
+              </a:spcAft>
+              <a:buClr>
+                <a:schemeClr val="tx1"/>
+              </a:buClr>
+              <a:buSzPct val="100000"/>
+              <a:buFont typeface="Arial"/>
+              <a:buChar char="•"/>
+              <a:defRPr sz="1200" kern="1200" cap="small">
+                <a:gradFill flip="none" rotWithShape="1">
+                  <a:gsLst>
+                    <a:gs pos="0">
+                      <a:schemeClr val="tx1"/>
+                    </a:gs>
+                    <a:gs pos="100000">
+                      <a:schemeClr val="tx1">
+                        <a:lumMod val="75000"/>
+                      </a:schemeClr>
+                    </a:gs>
+                  </a:gsLst>
+                  <a:lin ang="5580000" scaled="0"/>
+                  <a:tileRect/>
+                </a:gradFill>
+                <a:effectLst>
+                  <a:glow rad="38100">
+                    <a:schemeClr val="bg1">
+                      <a:lumMod val="50000"/>
+                      <a:lumOff val="50000"/>
+                      <a:alpha val="20000"/>
+                    </a:schemeClr>
+                  </a:glow>
+                  <a:outerShdw blurRad="44450" dist="12700" dir="13860000" algn="tl" rotWithShape="0">
+                    <a:srgbClr val="000000">
+                      <a:alpha val="20000"/>
+                    </a:srgbClr>
+                  </a:outerShdw>
+                </a:effectLst>
+                <a:latin typeface="+mn-lt"/>
+                <a:ea typeface="+mn-ea"/>
+                <a:cs typeface="+mn-cs"/>
+              </a:defRPr>
+            </a:lvl6pPr>
+            <a:lvl7pPr marL="2971800" indent="-228600" algn="l" defTabSz="457200" rtl="0" eaLnBrk="1" latinLnBrk="0" hangingPunct="1">
+              <a:spcBef>
+                <a:spcPct val="20000"/>
+              </a:spcBef>
+              <a:spcAft>
+                <a:spcPts val="600"/>
+              </a:spcAft>
+              <a:buClr>
+                <a:schemeClr val="tx1"/>
+              </a:buClr>
+              <a:buSzPct val="100000"/>
+              <a:buFont typeface="Arial"/>
+              <a:buChar char="•"/>
+              <a:defRPr sz="1200" kern="1200" cap="small">
+                <a:gradFill flip="none" rotWithShape="1">
+                  <a:gsLst>
+                    <a:gs pos="0">
+                      <a:schemeClr val="tx1"/>
+                    </a:gs>
+                    <a:gs pos="100000">
+                      <a:schemeClr val="tx1">
+                        <a:lumMod val="75000"/>
+                      </a:schemeClr>
+                    </a:gs>
+                  </a:gsLst>
+                  <a:lin ang="5580000" scaled="0"/>
+                  <a:tileRect/>
+                </a:gradFill>
+                <a:effectLst>
+                  <a:glow rad="38100">
+                    <a:schemeClr val="bg1">
+                      <a:lumMod val="50000"/>
+                      <a:lumOff val="50000"/>
+                      <a:alpha val="20000"/>
+                    </a:schemeClr>
+                  </a:glow>
+                  <a:outerShdw blurRad="44450" dist="12700" dir="13860000" algn="tl" rotWithShape="0">
+                    <a:srgbClr val="000000">
+                      <a:alpha val="20000"/>
+                    </a:srgbClr>
+                  </a:outerShdw>
+                </a:effectLst>
+                <a:latin typeface="+mn-lt"/>
+                <a:ea typeface="+mn-ea"/>
+                <a:cs typeface="+mn-cs"/>
+              </a:defRPr>
+            </a:lvl7pPr>
+            <a:lvl8pPr marL="3429000" indent="-228600" algn="l" defTabSz="457200" rtl="0" eaLnBrk="1" latinLnBrk="0" hangingPunct="1">
+              <a:spcBef>
+                <a:spcPct val="20000"/>
+              </a:spcBef>
+              <a:spcAft>
+                <a:spcPts val="600"/>
+              </a:spcAft>
+              <a:buClr>
+                <a:schemeClr val="tx1"/>
+              </a:buClr>
+              <a:buSzPct val="100000"/>
+              <a:buFont typeface="Arial"/>
+              <a:buChar char="•"/>
+              <a:defRPr sz="1200" kern="1200" cap="small">
+                <a:gradFill flip="none" rotWithShape="1">
+                  <a:gsLst>
+                    <a:gs pos="0">
+                      <a:schemeClr val="tx1"/>
+                    </a:gs>
+                    <a:gs pos="100000">
+                      <a:schemeClr val="tx1">
+                        <a:lumMod val="75000"/>
+                      </a:schemeClr>
+                    </a:gs>
+                  </a:gsLst>
+                  <a:lin ang="5580000" scaled="0"/>
+                  <a:tileRect/>
+                </a:gradFill>
+                <a:effectLst>
+                  <a:glow rad="38100">
+                    <a:schemeClr val="bg1">
+                      <a:lumMod val="50000"/>
+                      <a:lumOff val="50000"/>
+                      <a:alpha val="20000"/>
+                    </a:schemeClr>
+                  </a:glow>
+                  <a:outerShdw blurRad="44450" dist="12700" dir="13860000" algn="tl" rotWithShape="0">
+                    <a:srgbClr val="000000">
+                      <a:alpha val="20000"/>
+                    </a:srgbClr>
+                  </a:outerShdw>
+                </a:effectLst>
+                <a:latin typeface="+mn-lt"/>
+                <a:ea typeface="+mn-ea"/>
+                <a:cs typeface="+mn-cs"/>
+              </a:defRPr>
+            </a:lvl8pPr>
+            <a:lvl9pPr marL="3886200" indent="-228600" algn="l" defTabSz="457200" rtl="0" eaLnBrk="1" latinLnBrk="0" hangingPunct="1">
+              <a:spcBef>
+                <a:spcPct val="20000"/>
+              </a:spcBef>
+              <a:spcAft>
+                <a:spcPts val="600"/>
+              </a:spcAft>
+              <a:buClr>
+                <a:schemeClr val="tx1"/>
+              </a:buClr>
+              <a:buSzPct val="100000"/>
+              <a:buFont typeface="Arial"/>
+              <a:buChar char="•"/>
+              <a:defRPr sz="1200" kern="1200" cap="small">
+                <a:gradFill flip="none" rotWithShape="1">
+                  <a:gsLst>
+                    <a:gs pos="0">
+                      <a:schemeClr val="tx1"/>
+                    </a:gs>
+                    <a:gs pos="100000">
+                      <a:schemeClr val="tx1">
+                        <a:lumMod val="75000"/>
+                      </a:schemeClr>
+                    </a:gs>
+                  </a:gsLst>
+                  <a:lin ang="5580000" scaled="0"/>
+                  <a:tileRect/>
+                </a:gradFill>
+                <a:effectLst>
+                  <a:glow rad="38100">
+                    <a:schemeClr val="bg1">
+                      <a:lumMod val="50000"/>
+                      <a:lumOff val="50000"/>
+                      <a:alpha val="20000"/>
+                    </a:schemeClr>
+                  </a:glow>
+                  <a:outerShdw blurRad="44450" dist="12700" dir="13860000" algn="tl" rotWithShape="0">
+                    <a:srgbClr val="000000">
+                      <a:alpha val="20000"/>
+                    </a:srgbClr>
+                  </a:outerShdw>
+                </a:effectLst>
+                <a:latin typeface="+mn-lt"/>
+                <a:ea typeface="+mn-ea"/>
+                <a:cs typeface="+mn-cs"/>
+              </a:defRPr>
+            </a:lvl9pPr>
+          </a:lstStyle>
+          <a:p>
+            <a:pPr marL="0" indent="0" algn="ctr">
+              <a:buFont typeface="Arial"/>
+              <a:buNone/>
+            </a:pPr>
+            <a:r>
+              <a:rPr lang="en-GB" dirty="0" smtClean="0"/>
+              <a:t>Contact Administrator</a:t>
+            </a:r>
+            <a:endParaRPr lang="en-GB" dirty="0"/>
           </a:p>
         </p:txBody>
       </p:sp>
     </p:spTree>
     <p:extLst>
       <p:ext uri="{BB962C8B-B14F-4D97-AF65-F5344CB8AC3E}">
-        <p14:creationId xmlns:p14="http://schemas.microsoft.com/office/powerpoint/2010/main" val="2072003033"/>
+        <p14:creationId xmlns:p14="http://schemas.microsoft.com/office/powerpoint/2010/main" val="3912012650"/>
       </p:ext>
     </p:extLst>
   </p:cSld>
   <p:clrMapOvr>
     <a:masterClrMapping/>
   </p:clrMapOvr>
+  <mc:AlternateContent xmlns:mc="http://schemas.openxmlformats.org/markup-compatibility/2006" xmlns:p14="http://schemas.microsoft.com/office/powerpoint/2010/main">
+    <mc:Choice Requires="p14">
+      <p:transition spd="med" p14:dur="700">
+        <p:fade/>
+      </p:transition>
+    </mc:Choice>
+    <mc:Fallback xmlns="">
+      <p:transition spd="med">
+        <p:fade/>
+      </p:transition>
+    </mc:Fallback>
+  </mc:AlternateContent>
+  <p:timing>
+    <p:tnLst>
+      <p:par>
+        <p:cTn id="1" dur="indefinite" restart="never" nodeType="tmRoot"/>
+      </p:par>
+    </p:tnLst>
+  </p:timing>
+</p:sld>
+</file>
+
+<file path=ppt/slides/slide11.xml><?xml version="1.0" encoding="utf-8"?>
+<p:sld xmlns:a="http://schemas.openxmlformats.org/drawingml/2006/main" xmlns:r="http://schemas.openxmlformats.org/officeDocument/2006/relationships" xmlns:p="http://schemas.openxmlformats.org/presentationml/2006/main">
+  <p:cSld>
+    <p:spTree>
+      <p:nvGrpSpPr>
+        <p:cNvPr id="1" name=""/>
+        <p:cNvGrpSpPr/>
+        <p:nvPr/>
+      </p:nvGrpSpPr>
+      <p:grpSpPr>
+        <a:xfrm>
+          <a:off x="0" y="0"/>
+          <a:ext cx="0" cy="0"/>
+          <a:chOff x="0" y="0"/>
+          <a:chExt cx="0" cy="0"/>
+        </a:xfrm>
+      </p:grpSpPr>
+      <p:sp>
+        <p:nvSpPr>
+          <p:cNvPr id="2" name="Title 1"/>
+          <p:cNvSpPr>
+            <a:spLocks noGrp="1"/>
+          </p:cNvSpPr>
+          <p:nvPr>
+            <p:ph type="title"/>
+          </p:nvPr>
+        </p:nvSpPr>
+        <p:spPr>
+          <a:xfrm>
+            <a:off x="1141413" y="101603"/>
+            <a:ext cx="9905998" cy="864973"/>
+          </a:xfrm>
+        </p:spPr>
+        <p:txBody>
+          <a:bodyPr/>
+          <a:lstStyle/>
+          <a:p>
+            <a:pPr algn="ctr"/>
+            <a:r>
+              <a:rPr lang="en-GB" dirty="0" smtClean="0"/>
+              <a:t>Design – Administrative Users</a:t>
+            </a:r>
+            <a:endParaRPr lang="en-GB" dirty="0"/>
+          </a:p>
+        </p:txBody>
+      </p:sp>
+      <p:pic>
+        <p:nvPicPr>
+          <p:cNvPr id="3" name="Picture 2"/>
+          <p:cNvPicPr>
+            <a:picLocks noChangeAspect="1"/>
+          </p:cNvPicPr>
+          <p:nvPr/>
+        </p:nvPicPr>
+        <p:blipFill>
+          <a:blip r:embed="rId2">
+            <a:extLst>
+              <a:ext uri="{28A0092B-C50C-407E-A947-70E740481C1C}">
+                <a14:useLocalDpi xmlns:a14="http://schemas.microsoft.com/office/drawing/2010/main" val="0"/>
+              </a:ext>
+            </a:extLst>
+          </a:blip>
+          <a:stretch>
+            <a:fillRect/>
+          </a:stretch>
+        </p:blipFill>
+        <p:spPr>
+          <a:xfrm>
+            <a:off x="443647" y="991291"/>
+            <a:ext cx="4784042" cy="2691024"/>
+          </a:xfrm>
+          <a:prstGeom prst="rect">
+            <a:avLst/>
+          </a:prstGeom>
+        </p:spPr>
+      </p:pic>
+      <p:pic>
+        <p:nvPicPr>
+          <p:cNvPr id="4" name="Picture 3"/>
+          <p:cNvPicPr>
+            <a:picLocks noChangeAspect="1"/>
+          </p:cNvPicPr>
+          <p:nvPr/>
+        </p:nvPicPr>
+        <p:blipFill>
+          <a:blip r:embed="rId3">
+            <a:extLst>
+              <a:ext uri="{28A0092B-C50C-407E-A947-70E740481C1C}">
+                <a14:useLocalDpi xmlns:a14="http://schemas.microsoft.com/office/drawing/2010/main" val="0"/>
+              </a:ext>
+            </a:extLst>
+          </a:blip>
+          <a:stretch>
+            <a:fillRect/>
+          </a:stretch>
+        </p:blipFill>
+        <p:spPr>
+          <a:xfrm>
+            <a:off x="6488080" y="991290"/>
+            <a:ext cx="4784044" cy="2691025"/>
+          </a:xfrm>
+          <a:prstGeom prst="rect">
+            <a:avLst/>
+          </a:prstGeom>
+        </p:spPr>
+      </p:pic>
+      <p:pic>
+        <p:nvPicPr>
+          <p:cNvPr id="6" name="Picture 5"/>
+          <p:cNvPicPr>
+            <a:picLocks noChangeAspect="1"/>
+          </p:cNvPicPr>
+          <p:nvPr/>
+        </p:nvPicPr>
+        <p:blipFill>
+          <a:blip r:embed="rId4">
+            <a:extLst>
+              <a:ext uri="{28A0092B-C50C-407E-A947-70E740481C1C}">
+                <a14:useLocalDpi xmlns:a14="http://schemas.microsoft.com/office/drawing/2010/main" val="0"/>
+              </a:ext>
+            </a:extLst>
+          </a:blip>
+          <a:stretch>
+            <a:fillRect/>
+          </a:stretch>
+        </p:blipFill>
+        <p:spPr>
+          <a:xfrm>
+            <a:off x="6488079" y="4053025"/>
+            <a:ext cx="4784046" cy="2691026"/>
+          </a:xfrm>
+          <a:prstGeom prst="rect">
+            <a:avLst/>
+          </a:prstGeom>
+        </p:spPr>
+      </p:pic>
+      <p:sp>
+        <p:nvSpPr>
+          <p:cNvPr id="8" name="Content Placeholder 2"/>
+          <p:cNvSpPr>
+            <a:spLocks noGrp="1"/>
+          </p:cNvSpPr>
+          <p:nvPr>
+            <p:ph idx="1"/>
+          </p:nvPr>
+        </p:nvSpPr>
+        <p:spPr>
+          <a:xfrm>
+            <a:off x="394811" y="768870"/>
+            <a:ext cx="4832878" cy="218533"/>
+          </a:xfrm>
+        </p:spPr>
+        <p:txBody>
+          <a:bodyPr>
+            <a:normAutofit fontScale="47500" lnSpcReduction="20000"/>
+          </a:bodyPr>
+          <a:lstStyle/>
+          <a:p>
+            <a:pPr marL="0" indent="0" algn="ctr">
+              <a:buNone/>
+            </a:pPr>
+            <a:r>
+              <a:rPr lang="en-GB" dirty="0" smtClean="0"/>
+              <a:t>Administrator Dashboard Overview</a:t>
+            </a:r>
+            <a:endParaRPr lang="en-GB" dirty="0"/>
+          </a:p>
+        </p:txBody>
+      </p:sp>
+      <p:sp>
+        <p:nvSpPr>
+          <p:cNvPr id="10" name="Content Placeholder 2"/>
+          <p:cNvSpPr txBox="1">
+            <a:spLocks/>
+          </p:cNvSpPr>
+          <p:nvPr/>
+        </p:nvSpPr>
+        <p:spPr>
+          <a:xfrm>
+            <a:off x="6488078" y="772763"/>
+            <a:ext cx="4832878" cy="218533"/>
+          </a:xfrm>
+          <a:prstGeom prst="rect">
+            <a:avLst/>
+          </a:prstGeom>
+        </p:spPr>
+        <p:txBody>
+          <a:bodyPr vert="horz" lIns="91440" tIns="45720" rIns="91440" bIns="45720" rtlCol="0" anchor="ctr">
+            <a:normAutofit fontScale="47500" lnSpcReduction="20000"/>
+          </a:bodyPr>
+          <a:lstStyle>
+            <a:lvl1pPr marL="285750" indent="-285750" algn="l" defTabSz="457200" rtl="0" eaLnBrk="1" latinLnBrk="0" hangingPunct="1">
+              <a:spcBef>
+                <a:spcPct val="20000"/>
+              </a:spcBef>
+              <a:spcAft>
+                <a:spcPts val="600"/>
+              </a:spcAft>
+              <a:buClr>
+                <a:schemeClr val="tx1"/>
+              </a:buClr>
+              <a:buSzPct val="100000"/>
+              <a:buFont typeface="Arial"/>
+              <a:buChar char="•"/>
+              <a:defRPr sz="2000" kern="1200" cap="small">
+                <a:gradFill flip="none" rotWithShape="1">
+                  <a:gsLst>
+                    <a:gs pos="0">
+                      <a:schemeClr val="tx1"/>
+                    </a:gs>
+                    <a:gs pos="100000">
+                      <a:schemeClr val="tx1">
+                        <a:lumMod val="75000"/>
+                      </a:schemeClr>
+                    </a:gs>
+                  </a:gsLst>
+                  <a:lin ang="5580000" scaled="0"/>
+                  <a:tileRect/>
+                </a:gradFill>
+                <a:effectLst>
+                  <a:glow rad="38100">
+                    <a:schemeClr val="bg1">
+                      <a:lumMod val="50000"/>
+                      <a:lumOff val="50000"/>
+                      <a:alpha val="20000"/>
+                    </a:schemeClr>
+                  </a:glow>
+                  <a:outerShdw blurRad="44450" dist="12700" dir="13860000" algn="tl" rotWithShape="0">
+                    <a:srgbClr val="000000">
+                      <a:alpha val="20000"/>
+                    </a:srgbClr>
+                  </a:outerShdw>
+                </a:effectLst>
+                <a:latin typeface="+mn-lt"/>
+                <a:ea typeface="+mn-ea"/>
+                <a:cs typeface="+mn-cs"/>
+              </a:defRPr>
+            </a:lvl1pPr>
+            <a:lvl2pPr marL="742950" indent="-285750" algn="l" defTabSz="457200" rtl="0" eaLnBrk="1" latinLnBrk="0" hangingPunct="1">
+              <a:spcBef>
+                <a:spcPct val="20000"/>
+              </a:spcBef>
+              <a:spcAft>
+                <a:spcPts val="600"/>
+              </a:spcAft>
+              <a:buClr>
+                <a:schemeClr val="tx1"/>
+              </a:buClr>
+              <a:buSzPct val="100000"/>
+              <a:buFont typeface="Arial"/>
+              <a:buChar char="•"/>
+              <a:defRPr sz="1800" kern="1200" cap="small">
+                <a:gradFill flip="none" rotWithShape="1">
+                  <a:gsLst>
+                    <a:gs pos="0">
+                      <a:schemeClr val="tx1"/>
+                    </a:gs>
+                    <a:gs pos="100000">
+                      <a:schemeClr val="tx1">
+                        <a:lumMod val="75000"/>
+                      </a:schemeClr>
+                    </a:gs>
+                  </a:gsLst>
+                  <a:lin ang="5580000" scaled="0"/>
+                  <a:tileRect/>
+                </a:gradFill>
+                <a:effectLst>
+                  <a:glow rad="38100">
+                    <a:schemeClr val="bg1">
+                      <a:lumMod val="50000"/>
+                      <a:lumOff val="50000"/>
+                      <a:alpha val="20000"/>
+                    </a:schemeClr>
+                  </a:glow>
+                  <a:outerShdw blurRad="44450" dist="12700" dir="13860000" algn="tl" rotWithShape="0">
+                    <a:srgbClr val="000000">
+                      <a:alpha val="20000"/>
+                    </a:srgbClr>
+                  </a:outerShdw>
+                </a:effectLst>
+                <a:latin typeface="+mn-lt"/>
+                <a:ea typeface="+mn-ea"/>
+                <a:cs typeface="+mn-cs"/>
+              </a:defRPr>
+            </a:lvl2pPr>
+            <a:lvl3pPr marL="1200150" indent="-285750" algn="l" defTabSz="457200" rtl="0" eaLnBrk="1" latinLnBrk="0" hangingPunct="1">
+              <a:spcBef>
+                <a:spcPct val="20000"/>
+              </a:spcBef>
+              <a:spcAft>
+                <a:spcPts val="600"/>
+              </a:spcAft>
+              <a:buClr>
+                <a:schemeClr val="tx1"/>
+              </a:buClr>
+              <a:buSzPct val="100000"/>
+              <a:buFont typeface="Arial"/>
+              <a:buChar char="•"/>
+              <a:defRPr sz="1600" kern="1200" cap="small">
+                <a:gradFill flip="none" rotWithShape="1">
+                  <a:gsLst>
+                    <a:gs pos="0">
+                      <a:schemeClr val="tx1"/>
+                    </a:gs>
+                    <a:gs pos="100000">
+                      <a:schemeClr val="tx1">
+                        <a:lumMod val="75000"/>
+                      </a:schemeClr>
+                    </a:gs>
+                  </a:gsLst>
+                  <a:lin ang="5580000" scaled="0"/>
+                  <a:tileRect/>
+                </a:gradFill>
+                <a:effectLst>
+                  <a:glow rad="38100">
+                    <a:schemeClr val="bg1">
+                      <a:lumMod val="50000"/>
+                      <a:lumOff val="50000"/>
+                      <a:alpha val="20000"/>
+                    </a:schemeClr>
+                  </a:glow>
+                  <a:outerShdw blurRad="44450" dist="12700" dir="13860000" algn="tl" rotWithShape="0">
+                    <a:srgbClr val="000000">
+                      <a:alpha val="20000"/>
+                    </a:srgbClr>
+                  </a:outerShdw>
+                </a:effectLst>
+                <a:latin typeface="+mn-lt"/>
+                <a:ea typeface="+mn-ea"/>
+                <a:cs typeface="+mn-cs"/>
+              </a:defRPr>
+            </a:lvl3pPr>
+            <a:lvl4pPr marL="1543050" indent="-171450" algn="l" defTabSz="457200" rtl="0" eaLnBrk="1" latinLnBrk="0" hangingPunct="1">
+              <a:spcBef>
+                <a:spcPct val="20000"/>
+              </a:spcBef>
+              <a:spcAft>
+                <a:spcPts val="600"/>
+              </a:spcAft>
+              <a:buClr>
+                <a:schemeClr val="tx1"/>
+              </a:buClr>
+              <a:buSzPct val="100000"/>
+              <a:buFont typeface="Arial"/>
+              <a:buChar char="•"/>
+              <a:defRPr sz="1400" kern="1200" cap="small">
+                <a:gradFill flip="none" rotWithShape="1">
+                  <a:gsLst>
+                    <a:gs pos="0">
+                      <a:schemeClr val="tx1"/>
+                    </a:gs>
+                    <a:gs pos="100000">
+                      <a:schemeClr val="tx1">
+                        <a:lumMod val="75000"/>
+                      </a:schemeClr>
+                    </a:gs>
+                  </a:gsLst>
+                  <a:lin ang="5580000" scaled="0"/>
+                  <a:tileRect/>
+                </a:gradFill>
+                <a:effectLst>
+                  <a:glow rad="38100">
+                    <a:schemeClr val="bg1">
+                      <a:lumMod val="50000"/>
+                      <a:lumOff val="50000"/>
+                      <a:alpha val="20000"/>
+                    </a:schemeClr>
+                  </a:glow>
+                  <a:outerShdw blurRad="44450" dist="12700" dir="13860000" algn="tl" rotWithShape="0">
+                    <a:srgbClr val="000000">
+                      <a:alpha val="20000"/>
+                    </a:srgbClr>
+                  </a:outerShdw>
+                </a:effectLst>
+                <a:latin typeface="+mn-lt"/>
+                <a:ea typeface="+mn-ea"/>
+                <a:cs typeface="+mn-cs"/>
+              </a:defRPr>
+            </a:lvl4pPr>
+            <a:lvl5pPr marL="2000250" indent="-171450" algn="l" defTabSz="457200" rtl="0" eaLnBrk="1" latinLnBrk="0" hangingPunct="1">
+              <a:spcBef>
+                <a:spcPct val="20000"/>
+              </a:spcBef>
+              <a:spcAft>
+                <a:spcPts val="600"/>
+              </a:spcAft>
+              <a:buClr>
+                <a:schemeClr val="tx1"/>
+              </a:buClr>
+              <a:buSzPct val="100000"/>
+              <a:buFont typeface="Arial"/>
+              <a:buChar char="•"/>
+              <a:defRPr sz="1400" kern="1200" cap="small">
+                <a:gradFill flip="none" rotWithShape="1">
+                  <a:gsLst>
+                    <a:gs pos="0">
+                      <a:schemeClr val="tx1"/>
+                    </a:gs>
+                    <a:gs pos="100000">
+                      <a:schemeClr val="tx1">
+                        <a:lumMod val="75000"/>
+                      </a:schemeClr>
+                    </a:gs>
+                  </a:gsLst>
+                  <a:lin ang="5580000" scaled="0"/>
+                  <a:tileRect/>
+                </a:gradFill>
+                <a:effectLst>
+                  <a:glow rad="38100">
+                    <a:schemeClr val="bg1">
+                      <a:lumMod val="50000"/>
+                      <a:lumOff val="50000"/>
+                      <a:alpha val="20000"/>
+                    </a:schemeClr>
+                  </a:glow>
+                  <a:outerShdw blurRad="44450" dist="12700" dir="13860000" algn="tl" rotWithShape="0">
+                    <a:srgbClr val="000000">
+                      <a:alpha val="20000"/>
+                    </a:srgbClr>
+                  </a:outerShdw>
+                </a:effectLst>
+                <a:latin typeface="+mn-lt"/>
+                <a:ea typeface="+mn-ea"/>
+                <a:cs typeface="+mn-cs"/>
+              </a:defRPr>
+            </a:lvl5pPr>
+            <a:lvl6pPr marL="2514600" indent="-228600" algn="l" defTabSz="457200" rtl="0" eaLnBrk="1" latinLnBrk="0" hangingPunct="1">
+              <a:spcBef>
+                <a:spcPct val="20000"/>
+              </a:spcBef>
+              <a:spcAft>
+                <a:spcPts val="600"/>
+              </a:spcAft>
+              <a:buClr>
+                <a:schemeClr val="tx1"/>
+              </a:buClr>
+              <a:buSzPct val="100000"/>
+              <a:buFont typeface="Arial"/>
+              <a:buChar char="•"/>
+              <a:defRPr sz="1200" kern="1200" cap="small">
+                <a:gradFill flip="none" rotWithShape="1">
+                  <a:gsLst>
+                    <a:gs pos="0">
+                      <a:schemeClr val="tx1"/>
+                    </a:gs>
+                    <a:gs pos="100000">
+                      <a:schemeClr val="tx1">
+                        <a:lumMod val="75000"/>
+                      </a:schemeClr>
+                    </a:gs>
+                  </a:gsLst>
+                  <a:lin ang="5580000" scaled="0"/>
+                  <a:tileRect/>
+                </a:gradFill>
+                <a:effectLst>
+                  <a:glow rad="38100">
+                    <a:schemeClr val="bg1">
+                      <a:lumMod val="50000"/>
+                      <a:lumOff val="50000"/>
+                      <a:alpha val="20000"/>
+                    </a:schemeClr>
+                  </a:glow>
+                  <a:outerShdw blurRad="44450" dist="12700" dir="13860000" algn="tl" rotWithShape="0">
+                    <a:srgbClr val="000000">
+                      <a:alpha val="20000"/>
+                    </a:srgbClr>
+                  </a:outerShdw>
+                </a:effectLst>
+                <a:latin typeface="+mn-lt"/>
+                <a:ea typeface="+mn-ea"/>
+                <a:cs typeface="+mn-cs"/>
+              </a:defRPr>
+            </a:lvl6pPr>
+            <a:lvl7pPr marL="2971800" indent="-228600" algn="l" defTabSz="457200" rtl="0" eaLnBrk="1" latinLnBrk="0" hangingPunct="1">
+              <a:spcBef>
+                <a:spcPct val="20000"/>
+              </a:spcBef>
+              <a:spcAft>
+                <a:spcPts val="600"/>
+              </a:spcAft>
+              <a:buClr>
+                <a:schemeClr val="tx1"/>
+              </a:buClr>
+              <a:buSzPct val="100000"/>
+              <a:buFont typeface="Arial"/>
+              <a:buChar char="•"/>
+              <a:defRPr sz="1200" kern="1200" cap="small">
+                <a:gradFill flip="none" rotWithShape="1">
+                  <a:gsLst>
+                    <a:gs pos="0">
+                      <a:schemeClr val="tx1"/>
+                    </a:gs>
+                    <a:gs pos="100000">
+                      <a:schemeClr val="tx1">
+                        <a:lumMod val="75000"/>
+                      </a:schemeClr>
+                    </a:gs>
+                  </a:gsLst>
+                  <a:lin ang="5580000" scaled="0"/>
+                  <a:tileRect/>
+                </a:gradFill>
+                <a:effectLst>
+                  <a:glow rad="38100">
+                    <a:schemeClr val="bg1">
+                      <a:lumMod val="50000"/>
+                      <a:lumOff val="50000"/>
+                      <a:alpha val="20000"/>
+                    </a:schemeClr>
+                  </a:glow>
+                  <a:outerShdw blurRad="44450" dist="12700" dir="13860000" algn="tl" rotWithShape="0">
+                    <a:srgbClr val="000000">
+                      <a:alpha val="20000"/>
+                    </a:srgbClr>
+                  </a:outerShdw>
+                </a:effectLst>
+                <a:latin typeface="+mn-lt"/>
+                <a:ea typeface="+mn-ea"/>
+                <a:cs typeface="+mn-cs"/>
+              </a:defRPr>
+            </a:lvl7pPr>
+            <a:lvl8pPr marL="3429000" indent="-228600" algn="l" defTabSz="457200" rtl="0" eaLnBrk="1" latinLnBrk="0" hangingPunct="1">
+              <a:spcBef>
+                <a:spcPct val="20000"/>
+              </a:spcBef>
+              <a:spcAft>
+                <a:spcPts val="600"/>
+              </a:spcAft>
+              <a:buClr>
+                <a:schemeClr val="tx1"/>
+              </a:buClr>
+              <a:buSzPct val="100000"/>
+              <a:buFont typeface="Arial"/>
+              <a:buChar char="•"/>
+              <a:defRPr sz="1200" kern="1200" cap="small">
+                <a:gradFill flip="none" rotWithShape="1">
+                  <a:gsLst>
+                    <a:gs pos="0">
+                      <a:schemeClr val="tx1"/>
+                    </a:gs>
+                    <a:gs pos="100000">
+                      <a:schemeClr val="tx1">
+                        <a:lumMod val="75000"/>
+                      </a:schemeClr>
+                    </a:gs>
+                  </a:gsLst>
+                  <a:lin ang="5580000" scaled="0"/>
+                  <a:tileRect/>
+                </a:gradFill>
+                <a:effectLst>
+                  <a:glow rad="38100">
+                    <a:schemeClr val="bg1">
+                      <a:lumMod val="50000"/>
+                      <a:lumOff val="50000"/>
+                      <a:alpha val="20000"/>
+                    </a:schemeClr>
+                  </a:glow>
+                  <a:outerShdw blurRad="44450" dist="12700" dir="13860000" algn="tl" rotWithShape="0">
+                    <a:srgbClr val="000000">
+                      <a:alpha val="20000"/>
+                    </a:srgbClr>
+                  </a:outerShdw>
+                </a:effectLst>
+                <a:latin typeface="+mn-lt"/>
+                <a:ea typeface="+mn-ea"/>
+                <a:cs typeface="+mn-cs"/>
+              </a:defRPr>
+            </a:lvl8pPr>
+            <a:lvl9pPr marL="3886200" indent="-228600" algn="l" defTabSz="457200" rtl="0" eaLnBrk="1" latinLnBrk="0" hangingPunct="1">
+              <a:spcBef>
+                <a:spcPct val="20000"/>
+              </a:spcBef>
+              <a:spcAft>
+                <a:spcPts val="600"/>
+              </a:spcAft>
+              <a:buClr>
+                <a:schemeClr val="tx1"/>
+              </a:buClr>
+              <a:buSzPct val="100000"/>
+              <a:buFont typeface="Arial"/>
+              <a:buChar char="•"/>
+              <a:defRPr sz="1200" kern="1200" cap="small">
+                <a:gradFill flip="none" rotWithShape="1">
+                  <a:gsLst>
+                    <a:gs pos="0">
+                      <a:schemeClr val="tx1"/>
+                    </a:gs>
+                    <a:gs pos="100000">
+                      <a:schemeClr val="tx1">
+                        <a:lumMod val="75000"/>
+                      </a:schemeClr>
+                    </a:gs>
+                  </a:gsLst>
+                  <a:lin ang="5580000" scaled="0"/>
+                  <a:tileRect/>
+                </a:gradFill>
+                <a:effectLst>
+                  <a:glow rad="38100">
+                    <a:schemeClr val="bg1">
+                      <a:lumMod val="50000"/>
+                      <a:lumOff val="50000"/>
+                      <a:alpha val="20000"/>
+                    </a:schemeClr>
+                  </a:glow>
+                  <a:outerShdw blurRad="44450" dist="12700" dir="13860000" algn="tl" rotWithShape="0">
+                    <a:srgbClr val="000000">
+                      <a:alpha val="20000"/>
+                    </a:srgbClr>
+                  </a:outerShdw>
+                </a:effectLst>
+                <a:latin typeface="+mn-lt"/>
+                <a:ea typeface="+mn-ea"/>
+                <a:cs typeface="+mn-cs"/>
+              </a:defRPr>
+            </a:lvl9pPr>
+          </a:lstStyle>
+          <a:p>
+            <a:pPr marL="0" indent="0" algn="ctr">
+              <a:buFont typeface="Arial"/>
+              <a:buNone/>
+            </a:pPr>
+            <a:r>
+              <a:rPr lang="en-GB" dirty="0" smtClean="0"/>
+              <a:t>Network Tab</a:t>
+            </a:r>
+            <a:endParaRPr lang="en-GB" dirty="0"/>
+          </a:p>
+        </p:txBody>
+      </p:sp>
+      <p:sp>
+        <p:nvSpPr>
+          <p:cNvPr id="11" name="Content Placeholder 2"/>
+          <p:cNvSpPr txBox="1">
+            <a:spLocks/>
+          </p:cNvSpPr>
+          <p:nvPr/>
+        </p:nvSpPr>
+        <p:spPr>
+          <a:xfrm>
+            <a:off x="394811" y="3792727"/>
+            <a:ext cx="4832878" cy="218533"/>
+          </a:xfrm>
+          <a:prstGeom prst="rect">
+            <a:avLst/>
+          </a:prstGeom>
+        </p:spPr>
+        <p:txBody>
+          <a:bodyPr vert="horz" lIns="91440" tIns="45720" rIns="91440" bIns="45720" rtlCol="0" anchor="ctr">
+            <a:normAutofit fontScale="47500" lnSpcReduction="20000"/>
+          </a:bodyPr>
+          <a:lstStyle>
+            <a:lvl1pPr marL="285750" indent="-285750" algn="l" defTabSz="457200" rtl="0" eaLnBrk="1" latinLnBrk="0" hangingPunct="1">
+              <a:spcBef>
+                <a:spcPct val="20000"/>
+              </a:spcBef>
+              <a:spcAft>
+                <a:spcPts val="600"/>
+              </a:spcAft>
+              <a:buClr>
+                <a:schemeClr val="tx1"/>
+              </a:buClr>
+              <a:buSzPct val="100000"/>
+              <a:buFont typeface="Arial"/>
+              <a:buChar char="•"/>
+              <a:defRPr sz="2000" kern="1200" cap="small">
+                <a:gradFill flip="none" rotWithShape="1">
+                  <a:gsLst>
+                    <a:gs pos="0">
+                      <a:schemeClr val="tx1"/>
+                    </a:gs>
+                    <a:gs pos="100000">
+                      <a:schemeClr val="tx1">
+                        <a:lumMod val="75000"/>
+                      </a:schemeClr>
+                    </a:gs>
+                  </a:gsLst>
+                  <a:lin ang="5580000" scaled="0"/>
+                  <a:tileRect/>
+                </a:gradFill>
+                <a:effectLst>
+                  <a:glow rad="38100">
+                    <a:schemeClr val="bg1">
+                      <a:lumMod val="50000"/>
+                      <a:lumOff val="50000"/>
+                      <a:alpha val="20000"/>
+                    </a:schemeClr>
+                  </a:glow>
+                  <a:outerShdw blurRad="44450" dist="12700" dir="13860000" algn="tl" rotWithShape="0">
+                    <a:srgbClr val="000000">
+                      <a:alpha val="20000"/>
+                    </a:srgbClr>
+                  </a:outerShdw>
+                </a:effectLst>
+                <a:latin typeface="+mn-lt"/>
+                <a:ea typeface="+mn-ea"/>
+                <a:cs typeface="+mn-cs"/>
+              </a:defRPr>
+            </a:lvl1pPr>
+            <a:lvl2pPr marL="742950" indent="-285750" algn="l" defTabSz="457200" rtl="0" eaLnBrk="1" latinLnBrk="0" hangingPunct="1">
+              <a:spcBef>
+                <a:spcPct val="20000"/>
+              </a:spcBef>
+              <a:spcAft>
+                <a:spcPts val="600"/>
+              </a:spcAft>
+              <a:buClr>
+                <a:schemeClr val="tx1"/>
+              </a:buClr>
+              <a:buSzPct val="100000"/>
+              <a:buFont typeface="Arial"/>
+              <a:buChar char="•"/>
+              <a:defRPr sz="1800" kern="1200" cap="small">
+                <a:gradFill flip="none" rotWithShape="1">
+                  <a:gsLst>
+                    <a:gs pos="0">
+                      <a:schemeClr val="tx1"/>
+                    </a:gs>
+                    <a:gs pos="100000">
+                      <a:schemeClr val="tx1">
+                        <a:lumMod val="75000"/>
+                      </a:schemeClr>
+                    </a:gs>
+                  </a:gsLst>
+                  <a:lin ang="5580000" scaled="0"/>
+                  <a:tileRect/>
+                </a:gradFill>
+                <a:effectLst>
+                  <a:glow rad="38100">
+                    <a:schemeClr val="bg1">
+                      <a:lumMod val="50000"/>
+                      <a:lumOff val="50000"/>
+                      <a:alpha val="20000"/>
+                    </a:schemeClr>
+                  </a:glow>
+                  <a:outerShdw blurRad="44450" dist="12700" dir="13860000" algn="tl" rotWithShape="0">
+                    <a:srgbClr val="000000">
+                      <a:alpha val="20000"/>
+                    </a:srgbClr>
+                  </a:outerShdw>
+                </a:effectLst>
+                <a:latin typeface="+mn-lt"/>
+                <a:ea typeface="+mn-ea"/>
+                <a:cs typeface="+mn-cs"/>
+              </a:defRPr>
+            </a:lvl2pPr>
+            <a:lvl3pPr marL="1200150" indent="-285750" algn="l" defTabSz="457200" rtl="0" eaLnBrk="1" latinLnBrk="0" hangingPunct="1">
+              <a:spcBef>
+                <a:spcPct val="20000"/>
+              </a:spcBef>
+              <a:spcAft>
+                <a:spcPts val="600"/>
+              </a:spcAft>
+              <a:buClr>
+                <a:schemeClr val="tx1"/>
+              </a:buClr>
+              <a:buSzPct val="100000"/>
+              <a:buFont typeface="Arial"/>
+              <a:buChar char="•"/>
+              <a:defRPr sz="1600" kern="1200" cap="small">
+                <a:gradFill flip="none" rotWithShape="1">
+                  <a:gsLst>
+                    <a:gs pos="0">
+                      <a:schemeClr val="tx1"/>
+                    </a:gs>
+                    <a:gs pos="100000">
+                      <a:schemeClr val="tx1">
+                        <a:lumMod val="75000"/>
+                      </a:schemeClr>
+                    </a:gs>
+                  </a:gsLst>
+                  <a:lin ang="5580000" scaled="0"/>
+                  <a:tileRect/>
+                </a:gradFill>
+                <a:effectLst>
+                  <a:glow rad="38100">
+                    <a:schemeClr val="bg1">
+                      <a:lumMod val="50000"/>
+                      <a:lumOff val="50000"/>
+                      <a:alpha val="20000"/>
+                    </a:schemeClr>
+                  </a:glow>
+                  <a:outerShdw blurRad="44450" dist="12700" dir="13860000" algn="tl" rotWithShape="0">
+                    <a:srgbClr val="000000">
+                      <a:alpha val="20000"/>
+                    </a:srgbClr>
+                  </a:outerShdw>
+                </a:effectLst>
+                <a:latin typeface="+mn-lt"/>
+                <a:ea typeface="+mn-ea"/>
+                <a:cs typeface="+mn-cs"/>
+              </a:defRPr>
+            </a:lvl3pPr>
+            <a:lvl4pPr marL="1543050" indent="-171450" algn="l" defTabSz="457200" rtl="0" eaLnBrk="1" latinLnBrk="0" hangingPunct="1">
+              <a:spcBef>
+                <a:spcPct val="20000"/>
+              </a:spcBef>
+              <a:spcAft>
+                <a:spcPts val="600"/>
+              </a:spcAft>
+              <a:buClr>
+                <a:schemeClr val="tx1"/>
+              </a:buClr>
+              <a:buSzPct val="100000"/>
+              <a:buFont typeface="Arial"/>
+              <a:buChar char="•"/>
+              <a:defRPr sz="1400" kern="1200" cap="small">
+                <a:gradFill flip="none" rotWithShape="1">
+                  <a:gsLst>
+                    <a:gs pos="0">
+                      <a:schemeClr val="tx1"/>
+                    </a:gs>
+                    <a:gs pos="100000">
+                      <a:schemeClr val="tx1">
+                        <a:lumMod val="75000"/>
+                      </a:schemeClr>
+                    </a:gs>
+                  </a:gsLst>
+                  <a:lin ang="5580000" scaled="0"/>
+                  <a:tileRect/>
+                </a:gradFill>
+                <a:effectLst>
+                  <a:glow rad="38100">
+                    <a:schemeClr val="bg1">
+                      <a:lumMod val="50000"/>
+                      <a:lumOff val="50000"/>
+                      <a:alpha val="20000"/>
+                    </a:schemeClr>
+                  </a:glow>
+                  <a:outerShdw blurRad="44450" dist="12700" dir="13860000" algn="tl" rotWithShape="0">
+                    <a:srgbClr val="000000">
+                      <a:alpha val="20000"/>
+                    </a:srgbClr>
+                  </a:outerShdw>
+                </a:effectLst>
+                <a:latin typeface="+mn-lt"/>
+                <a:ea typeface="+mn-ea"/>
+                <a:cs typeface="+mn-cs"/>
+              </a:defRPr>
+            </a:lvl4pPr>
+            <a:lvl5pPr marL="2000250" indent="-171450" algn="l" defTabSz="457200" rtl="0" eaLnBrk="1" latinLnBrk="0" hangingPunct="1">
+              <a:spcBef>
+                <a:spcPct val="20000"/>
+              </a:spcBef>
+              <a:spcAft>
+                <a:spcPts val="600"/>
+              </a:spcAft>
+              <a:buClr>
+                <a:schemeClr val="tx1"/>
+              </a:buClr>
+              <a:buSzPct val="100000"/>
+              <a:buFont typeface="Arial"/>
+              <a:buChar char="•"/>
+              <a:defRPr sz="1400" kern="1200" cap="small">
+                <a:gradFill flip="none" rotWithShape="1">
+                  <a:gsLst>
+                    <a:gs pos="0">
+                      <a:schemeClr val="tx1"/>
+                    </a:gs>
+                    <a:gs pos="100000">
+                      <a:schemeClr val="tx1">
+                        <a:lumMod val="75000"/>
+                      </a:schemeClr>
+                    </a:gs>
+                  </a:gsLst>
+                  <a:lin ang="5580000" scaled="0"/>
+                  <a:tileRect/>
+                </a:gradFill>
+                <a:effectLst>
+                  <a:glow rad="38100">
+                    <a:schemeClr val="bg1">
+                      <a:lumMod val="50000"/>
+                      <a:lumOff val="50000"/>
+                      <a:alpha val="20000"/>
+                    </a:schemeClr>
+                  </a:glow>
+                  <a:outerShdw blurRad="44450" dist="12700" dir="13860000" algn="tl" rotWithShape="0">
+                    <a:srgbClr val="000000">
+                      <a:alpha val="20000"/>
+                    </a:srgbClr>
+                  </a:outerShdw>
+                </a:effectLst>
+                <a:latin typeface="+mn-lt"/>
+                <a:ea typeface="+mn-ea"/>
+                <a:cs typeface="+mn-cs"/>
+              </a:defRPr>
+            </a:lvl5pPr>
+            <a:lvl6pPr marL="2514600" indent="-228600" algn="l" defTabSz="457200" rtl="0" eaLnBrk="1" latinLnBrk="0" hangingPunct="1">
+              <a:spcBef>
+                <a:spcPct val="20000"/>
+              </a:spcBef>
+              <a:spcAft>
+                <a:spcPts val="600"/>
+              </a:spcAft>
+              <a:buClr>
+                <a:schemeClr val="tx1"/>
+              </a:buClr>
+              <a:buSzPct val="100000"/>
+              <a:buFont typeface="Arial"/>
+              <a:buChar char="•"/>
+              <a:defRPr sz="1200" kern="1200" cap="small">
+                <a:gradFill flip="none" rotWithShape="1">
+                  <a:gsLst>
+                    <a:gs pos="0">
+                      <a:schemeClr val="tx1"/>
+                    </a:gs>
+                    <a:gs pos="100000">
+                      <a:schemeClr val="tx1">
+                        <a:lumMod val="75000"/>
+                      </a:schemeClr>
+                    </a:gs>
+                  </a:gsLst>
+                  <a:lin ang="5580000" scaled="0"/>
+                  <a:tileRect/>
+                </a:gradFill>
+                <a:effectLst>
+                  <a:glow rad="38100">
+                    <a:schemeClr val="bg1">
+                      <a:lumMod val="50000"/>
+                      <a:lumOff val="50000"/>
+                      <a:alpha val="20000"/>
+                    </a:schemeClr>
+                  </a:glow>
+                  <a:outerShdw blurRad="44450" dist="12700" dir="13860000" algn="tl" rotWithShape="0">
+                    <a:srgbClr val="000000">
+                      <a:alpha val="20000"/>
+                    </a:srgbClr>
+                  </a:outerShdw>
+                </a:effectLst>
+                <a:latin typeface="+mn-lt"/>
+                <a:ea typeface="+mn-ea"/>
+                <a:cs typeface="+mn-cs"/>
+              </a:defRPr>
+            </a:lvl6pPr>
+            <a:lvl7pPr marL="2971800" indent="-228600" algn="l" defTabSz="457200" rtl="0" eaLnBrk="1" latinLnBrk="0" hangingPunct="1">
+              <a:spcBef>
+                <a:spcPct val="20000"/>
+              </a:spcBef>
+              <a:spcAft>
+                <a:spcPts val="600"/>
+              </a:spcAft>
+              <a:buClr>
+                <a:schemeClr val="tx1"/>
+              </a:buClr>
+              <a:buSzPct val="100000"/>
+              <a:buFont typeface="Arial"/>
+              <a:buChar char="•"/>
+              <a:defRPr sz="1200" kern="1200" cap="small">
+                <a:gradFill flip="none" rotWithShape="1">
+                  <a:gsLst>
+                    <a:gs pos="0">
+                      <a:schemeClr val="tx1"/>
+                    </a:gs>
+                    <a:gs pos="100000">
+                      <a:schemeClr val="tx1">
+                        <a:lumMod val="75000"/>
+                      </a:schemeClr>
+                    </a:gs>
+                  </a:gsLst>
+                  <a:lin ang="5580000" scaled="0"/>
+                  <a:tileRect/>
+                </a:gradFill>
+                <a:effectLst>
+                  <a:glow rad="38100">
+                    <a:schemeClr val="bg1">
+                      <a:lumMod val="50000"/>
+                      <a:lumOff val="50000"/>
+                      <a:alpha val="20000"/>
+                    </a:schemeClr>
+                  </a:glow>
+                  <a:outerShdw blurRad="44450" dist="12700" dir="13860000" algn="tl" rotWithShape="0">
+                    <a:srgbClr val="000000">
+                      <a:alpha val="20000"/>
+                    </a:srgbClr>
+                  </a:outerShdw>
+                </a:effectLst>
+                <a:latin typeface="+mn-lt"/>
+                <a:ea typeface="+mn-ea"/>
+                <a:cs typeface="+mn-cs"/>
+              </a:defRPr>
+            </a:lvl7pPr>
+            <a:lvl8pPr marL="3429000" indent="-228600" algn="l" defTabSz="457200" rtl="0" eaLnBrk="1" latinLnBrk="0" hangingPunct="1">
+              <a:spcBef>
+                <a:spcPct val="20000"/>
+              </a:spcBef>
+              <a:spcAft>
+                <a:spcPts val="600"/>
+              </a:spcAft>
+              <a:buClr>
+                <a:schemeClr val="tx1"/>
+              </a:buClr>
+              <a:buSzPct val="100000"/>
+              <a:buFont typeface="Arial"/>
+              <a:buChar char="•"/>
+              <a:defRPr sz="1200" kern="1200" cap="small">
+                <a:gradFill flip="none" rotWithShape="1">
+                  <a:gsLst>
+                    <a:gs pos="0">
+                      <a:schemeClr val="tx1"/>
+                    </a:gs>
+                    <a:gs pos="100000">
+                      <a:schemeClr val="tx1">
+                        <a:lumMod val="75000"/>
+                      </a:schemeClr>
+                    </a:gs>
+                  </a:gsLst>
+                  <a:lin ang="5580000" scaled="0"/>
+                  <a:tileRect/>
+                </a:gradFill>
+                <a:effectLst>
+                  <a:glow rad="38100">
+                    <a:schemeClr val="bg1">
+                      <a:lumMod val="50000"/>
+                      <a:lumOff val="50000"/>
+                      <a:alpha val="20000"/>
+                    </a:schemeClr>
+                  </a:glow>
+                  <a:outerShdw blurRad="44450" dist="12700" dir="13860000" algn="tl" rotWithShape="0">
+                    <a:srgbClr val="000000">
+                      <a:alpha val="20000"/>
+                    </a:srgbClr>
+                  </a:outerShdw>
+                </a:effectLst>
+                <a:latin typeface="+mn-lt"/>
+                <a:ea typeface="+mn-ea"/>
+                <a:cs typeface="+mn-cs"/>
+              </a:defRPr>
+            </a:lvl8pPr>
+            <a:lvl9pPr marL="3886200" indent="-228600" algn="l" defTabSz="457200" rtl="0" eaLnBrk="1" latinLnBrk="0" hangingPunct="1">
+              <a:spcBef>
+                <a:spcPct val="20000"/>
+              </a:spcBef>
+              <a:spcAft>
+                <a:spcPts val="600"/>
+              </a:spcAft>
+              <a:buClr>
+                <a:schemeClr val="tx1"/>
+              </a:buClr>
+              <a:buSzPct val="100000"/>
+              <a:buFont typeface="Arial"/>
+              <a:buChar char="•"/>
+              <a:defRPr sz="1200" kern="1200" cap="small">
+                <a:gradFill flip="none" rotWithShape="1">
+                  <a:gsLst>
+                    <a:gs pos="0">
+                      <a:schemeClr val="tx1"/>
+                    </a:gs>
+                    <a:gs pos="100000">
+                      <a:schemeClr val="tx1">
+                        <a:lumMod val="75000"/>
+                      </a:schemeClr>
+                    </a:gs>
+                  </a:gsLst>
+                  <a:lin ang="5580000" scaled="0"/>
+                  <a:tileRect/>
+                </a:gradFill>
+                <a:effectLst>
+                  <a:glow rad="38100">
+                    <a:schemeClr val="bg1">
+                      <a:lumMod val="50000"/>
+                      <a:lumOff val="50000"/>
+                      <a:alpha val="20000"/>
+                    </a:schemeClr>
+                  </a:glow>
+                  <a:outerShdw blurRad="44450" dist="12700" dir="13860000" algn="tl" rotWithShape="0">
+                    <a:srgbClr val="000000">
+                      <a:alpha val="20000"/>
+                    </a:srgbClr>
+                  </a:outerShdw>
+                </a:effectLst>
+                <a:latin typeface="+mn-lt"/>
+                <a:ea typeface="+mn-ea"/>
+                <a:cs typeface="+mn-cs"/>
+              </a:defRPr>
+            </a:lvl9pPr>
+          </a:lstStyle>
+          <a:p>
+            <a:pPr marL="0" indent="0" algn="ctr">
+              <a:buFont typeface="Arial"/>
+              <a:buNone/>
+            </a:pPr>
+            <a:r>
+              <a:rPr lang="en-GB" dirty="0" smtClean="0"/>
+              <a:t>Review Tab</a:t>
+            </a:r>
+            <a:endParaRPr lang="en-GB" dirty="0"/>
+          </a:p>
+        </p:txBody>
+      </p:sp>
+      <p:sp>
+        <p:nvSpPr>
+          <p:cNvPr id="12" name="Content Placeholder 2"/>
+          <p:cNvSpPr txBox="1">
+            <a:spLocks/>
+          </p:cNvSpPr>
+          <p:nvPr/>
+        </p:nvSpPr>
+        <p:spPr>
+          <a:xfrm>
+            <a:off x="6439246" y="3792727"/>
+            <a:ext cx="4832878" cy="218533"/>
+          </a:xfrm>
+          <a:prstGeom prst="rect">
+            <a:avLst/>
+          </a:prstGeom>
+        </p:spPr>
+        <p:txBody>
+          <a:bodyPr vert="horz" lIns="91440" tIns="45720" rIns="91440" bIns="45720" rtlCol="0" anchor="ctr">
+            <a:normAutofit fontScale="47500" lnSpcReduction="20000"/>
+          </a:bodyPr>
+          <a:lstStyle>
+            <a:lvl1pPr marL="285750" indent="-285750" algn="l" defTabSz="457200" rtl="0" eaLnBrk="1" latinLnBrk="0" hangingPunct="1">
+              <a:spcBef>
+                <a:spcPct val="20000"/>
+              </a:spcBef>
+              <a:spcAft>
+                <a:spcPts val="600"/>
+              </a:spcAft>
+              <a:buClr>
+                <a:schemeClr val="tx1"/>
+              </a:buClr>
+              <a:buSzPct val="100000"/>
+              <a:buFont typeface="Arial"/>
+              <a:buChar char="•"/>
+              <a:defRPr sz="2000" kern="1200" cap="small">
+                <a:gradFill flip="none" rotWithShape="1">
+                  <a:gsLst>
+                    <a:gs pos="0">
+                      <a:schemeClr val="tx1"/>
+                    </a:gs>
+                    <a:gs pos="100000">
+                      <a:schemeClr val="tx1">
+                        <a:lumMod val="75000"/>
+                      </a:schemeClr>
+                    </a:gs>
+                  </a:gsLst>
+                  <a:lin ang="5580000" scaled="0"/>
+                  <a:tileRect/>
+                </a:gradFill>
+                <a:effectLst>
+                  <a:glow rad="38100">
+                    <a:schemeClr val="bg1">
+                      <a:lumMod val="50000"/>
+                      <a:lumOff val="50000"/>
+                      <a:alpha val="20000"/>
+                    </a:schemeClr>
+                  </a:glow>
+                  <a:outerShdw blurRad="44450" dist="12700" dir="13860000" algn="tl" rotWithShape="0">
+                    <a:srgbClr val="000000">
+                      <a:alpha val="20000"/>
+                    </a:srgbClr>
+                  </a:outerShdw>
+                </a:effectLst>
+                <a:latin typeface="+mn-lt"/>
+                <a:ea typeface="+mn-ea"/>
+                <a:cs typeface="+mn-cs"/>
+              </a:defRPr>
+            </a:lvl1pPr>
+            <a:lvl2pPr marL="742950" indent="-285750" algn="l" defTabSz="457200" rtl="0" eaLnBrk="1" latinLnBrk="0" hangingPunct="1">
+              <a:spcBef>
+                <a:spcPct val="20000"/>
+              </a:spcBef>
+              <a:spcAft>
+                <a:spcPts val="600"/>
+              </a:spcAft>
+              <a:buClr>
+                <a:schemeClr val="tx1"/>
+              </a:buClr>
+              <a:buSzPct val="100000"/>
+              <a:buFont typeface="Arial"/>
+              <a:buChar char="•"/>
+              <a:defRPr sz="1800" kern="1200" cap="small">
+                <a:gradFill flip="none" rotWithShape="1">
+                  <a:gsLst>
+                    <a:gs pos="0">
+                      <a:schemeClr val="tx1"/>
+                    </a:gs>
+                    <a:gs pos="100000">
+                      <a:schemeClr val="tx1">
+                        <a:lumMod val="75000"/>
+                      </a:schemeClr>
+                    </a:gs>
+                  </a:gsLst>
+                  <a:lin ang="5580000" scaled="0"/>
+                  <a:tileRect/>
+                </a:gradFill>
+                <a:effectLst>
+                  <a:glow rad="38100">
+                    <a:schemeClr val="bg1">
+                      <a:lumMod val="50000"/>
+                      <a:lumOff val="50000"/>
+                      <a:alpha val="20000"/>
+                    </a:schemeClr>
+                  </a:glow>
+                  <a:outerShdw blurRad="44450" dist="12700" dir="13860000" algn="tl" rotWithShape="0">
+                    <a:srgbClr val="000000">
+                      <a:alpha val="20000"/>
+                    </a:srgbClr>
+                  </a:outerShdw>
+                </a:effectLst>
+                <a:latin typeface="+mn-lt"/>
+                <a:ea typeface="+mn-ea"/>
+                <a:cs typeface="+mn-cs"/>
+              </a:defRPr>
+            </a:lvl2pPr>
+            <a:lvl3pPr marL="1200150" indent="-285750" algn="l" defTabSz="457200" rtl="0" eaLnBrk="1" latinLnBrk="0" hangingPunct="1">
+              <a:spcBef>
+                <a:spcPct val="20000"/>
+              </a:spcBef>
+              <a:spcAft>
+                <a:spcPts val="600"/>
+              </a:spcAft>
+              <a:buClr>
+                <a:schemeClr val="tx1"/>
+              </a:buClr>
+              <a:buSzPct val="100000"/>
+              <a:buFont typeface="Arial"/>
+              <a:buChar char="•"/>
+              <a:defRPr sz="1600" kern="1200" cap="small">
+                <a:gradFill flip="none" rotWithShape="1">
+                  <a:gsLst>
+                    <a:gs pos="0">
+                      <a:schemeClr val="tx1"/>
+                    </a:gs>
+                    <a:gs pos="100000">
+                      <a:schemeClr val="tx1">
+                        <a:lumMod val="75000"/>
+                      </a:schemeClr>
+                    </a:gs>
+                  </a:gsLst>
+                  <a:lin ang="5580000" scaled="0"/>
+                  <a:tileRect/>
+                </a:gradFill>
+                <a:effectLst>
+                  <a:glow rad="38100">
+                    <a:schemeClr val="bg1">
+                      <a:lumMod val="50000"/>
+                      <a:lumOff val="50000"/>
+                      <a:alpha val="20000"/>
+                    </a:schemeClr>
+                  </a:glow>
+                  <a:outerShdw blurRad="44450" dist="12700" dir="13860000" algn="tl" rotWithShape="0">
+                    <a:srgbClr val="000000">
+                      <a:alpha val="20000"/>
+                    </a:srgbClr>
+                  </a:outerShdw>
+                </a:effectLst>
+                <a:latin typeface="+mn-lt"/>
+                <a:ea typeface="+mn-ea"/>
+                <a:cs typeface="+mn-cs"/>
+              </a:defRPr>
+            </a:lvl3pPr>
+            <a:lvl4pPr marL="1543050" indent="-171450" algn="l" defTabSz="457200" rtl="0" eaLnBrk="1" latinLnBrk="0" hangingPunct="1">
+              <a:spcBef>
+                <a:spcPct val="20000"/>
+              </a:spcBef>
+              <a:spcAft>
+                <a:spcPts val="600"/>
+              </a:spcAft>
+              <a:buClr>
+                <a:schemeClr val="tx1"/>
+              </a:buClr>
+              <a:buSzPct val="100000"/>
+              <a:buFont typeface="Arial"/>
+              <a:buChar char="•"/>
+              <a:defRPr sz="1400" kern="1200" cap="small">
+                <a:gradFill flip="none" rotWithShape="1">
+                  <a:gsLst>
+                    <a:gs pos="0">
+                      <a:schemeClr val="tx1"/>
+                    </a:gs>
+                    <a:gs pos="100000">
+                      <a:schemeClr val="tx1">
+                        <a:lumMod val="75000"/>
+                      </a:schemeClr>
+                    </a:gs>
+                  </a:gsLst>
+                  <a:lin ang="5580000" scaled="0"/>
+                  <a:tileRect/>
+                </a:gradFill>
+                <a:effectLst>
+                  <a:glow rad="38100">
+                    <a:schemeClr val="bg1">
+                      <a:lumMod val="50000"/>
+                      <a:lumOff val="50000"/>
+                      <a:alpha val="20000"/>
+                    </a:schemeClr>
+                  </a:glow>
+                  <a:outerShdw blurRad="44450" dist="12700" dir="13860000" algn="tl" rotWithShape="0">
+                    <a:srgbClr val="000000">
+                      <a:alpha val="20000"/>
+                    </a:srgbClr>
+                  </a:outerShdw>
+                </a:effectLst>
+                <a:latin typeface="+mn-lt"/>
+                <a:ea typeface="+mn-ea"/>
+                <a:cs typeface="+mn-cs"/>
+              </a:defRPr>
+            </a:lvl4pPr>
+            <a:lvl5pPr marL="2000250" indent="-171450" algn="l" defTabSz="457200" rtl="0" eaLnBrk="1" latinLnBrk="0" hangingPunct="1">
+              <a:spcBef>
+                <a:spcPct val="20000"/>
+              </a:spcBef>
+              <a:spcAft>
+                <a:spcPts val="600"/>
+              </a:spcAft>
+              <a:buClr>
+                <a:schemeClr val="tx1"/>
+              </a:buClr>
+              <a:buSzPct val="100000"/>
+              <a:buFont typeface="Arial"/>
+              <a:buChar char="•"/>
+              <a:defRPr sz="1400" kern="1200" cap="small">
+                <a:gradFill flip="none" rotWithShape="1">
+                  <a:gsLst>
+                    <a:gs pos="0">
+                      <a:schemeClr val="tx1"/>
+                    </a:gs>
+                    <a:gs pos="100000">
+                      <a:schemeClr val="tx1">
+                        <a:lumMod val="75000"/>
+                      </a:schemeClr>
+                    </a:gs>
+                  </a:gsLst>
+                  <a:lin ang="5580000" scaled="0"/>
+                  <a:tileRect/>
+                </a:gradFill>
+                <a:effectLst>
+                  <a:glow rad="38100">
+                    <a:schemeClr val="bg1">
+                      <a:lumMod val="50000"/>
+                      <a:lumOff val="50000"/>
+                      <a:alpha val="20000"/>
+                    </a:schemeClr>
+                  </a:glow>
+                  <a:outerShdw blurRad="44450" dist="12700" dir="13860000" algn="tl" rotWithShape="0">
+                    <a:srgbClr val="000000">
+                      <a:alpha val="20000"/>
+                    </a:srgbClr>
+                  </a:outerShdw>
+                </a:effectLst>
+                <a:latin typeface="+mn-lt"/>
+                <a:ea typeface="+mn-ea"/>
+                <a:cs typeface="+mn-cs"/>
+              </a:defRPr>
+            </a:lvl5pPr>
+            <a:lvl6pPr marL="2514600" indent="-228600" algn="l" defTabSz="457200" rtl="0" eaLnBrk="1" latinLnBrk="0" hangingPunct="1">
+              <a:spcBef>
+                <a:spcPct val="20000"/>
+              </a:spcBef>
+              <a:spcAft>
+                <a:spcPts val="600"/>
+              </a:spcAft>
+              <a:buClr>
+                <a:schemeClr val="tx1"/>
+              </a:buClr>
+              <a:buSzPct val="100000"/>
+              <a:buFont typeface="Arial"/>
+              <a:buChar char="•"/>
+              <a:defRPr sz="1200" kern="1200" cap="small">
+                <a:gradFill flip="none" rotWithShape="1">
+                  <a:gsLst>
+                    <a:gs pos="0">
+                      <a:schemeClr val="tx1"/>
+                    </a:gs>
+                    <a:gs pos="100000">
+                      <a:schemeClr val="tx1">
+                        <a:lumMod val="75000"/>
+                      </a:schemeClr>
+                    </a:gs>
+                  </a:gsLst>
+                  <a:lin ang="5580000" scaled="0"/>
+                  <a:tileRect/>
+                </a:gradFill>
+                <a:effectLst>
+                  <a:glow rad="38100">
+                    <a:schemeClr val="bg1">
+                      <a:lumMod val="50000"/>
+                      <a:lumOff val="50000"/>
+                      <a:alpha val="20000"/>
+                    </a:schemeClr>
+                  </a:glow>
+                  <a:outerShdw blurRad="44450" dist="12700" dir="13860000" algn="tl" rotWithShape="0">
+                    <a:srgbClr val="000000">
+                      <a:alpha val="20000"/>
+                    </a:srgbClr>
+                  </a:outerShdw>
+                </a:effectLst>
+                <a:latin typeface="+mn-lt"/>
+                <a:ea typeface="+mn-ea"/>
+                <a:cs typeface="+mn-cs"/>
+              </a:defRPr>
+            </a:lvl6pPr>
+            <a:lvl7pPr marL="2971800" indent="-228600" algn="l" defTabSz="457200" rtl="0" eaLnBrk="1" latinLnBrk="0" hangingPunct="1">
+              <a:spcBef>
+                <a:spcPct val="20000"/>
+              </a:spcBef>
+              <a:spcAft>
+                <a:spcPts val="600"/>
+              </a:spcAft>
+              <a:buClr>
+                <a:schemeClr val="tx1"/>
+              </a:buClr>
+              <a:buSzPct val="100000"/>
+              <a:buFont typeface="Arial"/>
+              <a:buChar char="•"/>
+              <a:defRPr sz="1200" kern="1200" cap="small">
+                <a:gradFill flip="none" rotWithShape="1">
+                  <a:gsLst>
+                    <a:gs pos="0">
+                      <a:schemeClr val="tx1"/>
+                    </a:gs>
+                    <a:gs pos="100000">
+                      <a:schemeClr val="tx1">
+                        <a:lumMod val="75000"/>
+                      </a:schemeClr>
+                    </a:gs>
+                  </a:gsLst>
+                  <a:lin ang="5580000" scaled="0"/>
+                  <a:tileRect/>
+                </a:gradFill>
+                <a:effectLst>
+                  <a:glow rad="38100">
+                    <a:schemeClr val="bg1">
+                      <a:lumMod val="50000"/>
+                      <a:lumOff val="50000"/>
+                      <a:alpha val="20000"/>
+                    </a:schemeClr>
+                  </a:glow>
+                  <a:outerShdw blurRad="44450" dist="12700" dir="13860000" algn="tl" rotWithShape="0">
+                    <a:srgbClr val="000000">
+                      <a:alpha val="20000"/>
+                    </a:srgbClr>
+                  </a:outerShdw>
+                </a:effectLst>
+                <a:latin typeface="+mn-lt"/>
+                <a:ea typeface="+mn-ea"/>
+                <a:cs typeface="+mn-cs"/>
+              </a:defRPr>
+            </a:lvl7pPr>
+            <a:lvl8pPr marL="3429000" indent="-228600" algn="l" defTabSz="457200" rtl="0" eaLnBrk="1" latinLnBrk="0" hangingPunct="1">
+              <a:spcBef>
+                <a:spcPct val="20000"/>
+              </a:spcBef>
+              <a:spcAft>
+                <a:spcPts val="600"/>
+              </a:spcAft>
+              <a:buClr>
+                <a:schemeClr val="tx1"/>
+              </a:buClr>
+              <a:buSzPct val="100000"/>
+              <a:buFont typeface="Arial"/>
+              <a:buChar char="•"/>
+              <a:defRPr sz="1200" kern="1200" cap="small">
+                <a:gradFill flip="none" rotWithShape="1">
+                  <a:gsLst>
+                    <a:gs pos="0">
+                      <a:schemeClr val="tx1"/>
+                    </a:gs>
+                    <a:gs pos="100000">
+                      <a:schemeClr val="tx1">
+                        <a:lumMod val="75000"/>
+                      </a:schemeClr>
+                    </a:gs>
+                  </a:gsLst>
+                  <a:lin ang="5580000" scaled="0"/>
+                  <a:tileRect/>
+                </a:gradFill>
+                <a:effectLst>
+                  <a:glow rad="38100">
+                    <a:schemeClr val="bg1">
+                      <a:lumMod val="50000"/>
+                      <a:lumOff val="50000"/>
+                      <a:alpha val="20000"/>
+                    </a:schemeClr>
+                  </a:glow>
+                  <a:outerShdw blurRad="44450" dist="12700" dir="13860000" algn="tl" rotWithShape="0">
+                    <a:srgbClr val="000000">
+                      <a:alpha val="20000"/>
+                    </a:srgbClr>
+                  </a:outerShdw>
+                </a:effectLst>
+                <a:latin typeface="+mn-lt"/>
+                <a:ea typeface="+mn-ea"/>
+                <a:cs typeface="+mn-cs"/>
+              </a:defRPr>
+            </a:lvl8pPr>
+            <a:lvl9pPr marL="3886200" indent="-228600" algn="l" defTabSz="457200" rtl="0" eaLnBrk="1" latinLnBrk="0" hangingPunct="1">
+              <a:spcBef>
+                <a:spcPct val="20000"/>
+              </a:spcBef>
+              <a:spcAft>
+                <a:spcPts val="600"/>
+              </a:spcAft>
+              <a:buClr>
+                <a:schemeClr val="tx1"/>
+              </a:buClr>
+              <a:buSzPct val="100000"/>
+              <a:buFont typeface="Arial"/>
+              <a:buChar char="•"/>
+              <a:defRPr sz="1200" kern="1200" cap="small">
+                <a:gradFill flip="none" rotWithShape="1">
+                  <a:gsLst>
+                    <a:gs pos="0">
+                      <a:schemeClr val="tx1"/>
+                    </a:gs>
+                    <a:gs pos="100000">
+                      <a:schemeClr val="tx1">
+                        <a:lumMod val="75000"/>
+                      </a:schemeClr>
+                    </a:gs>
+                  </a:gsLst>
+                  <a:lin ang="5580000" scaled="0"/>
+                  <a:tileRect/>
+                </a:gradFill>
+                <a:effectLst>
+                  <a:glow rad="38100">
+                    <a:schemeClr val="bg1">
+                      <a:lumMod val="50000"/>
+                      <a:lumOff val="50000"/>
+                      <a:alpha val="20000"/>
+                    </a:schemeClr>
+                  </a:glow>
+                  <a:outerShdw blurRad="44450" dist="12700" dir="13860000" algn="tl" rotWithShape="0">
+                    <a:srgbClr val="000000">
+                      <a:alpha val="20000"/>
+                    </a:srgbClr>
+                  </a:outerShdw>
+                </a:effectLst>
+                <a:latin typeface="+mn-lt"/>
+                <a:ea typeface="+mn-ea"/>
+                <a:cs typeface="+mn-cs"/>
+              </a:defRPr>
+            </a:lvl9pPr>
+          </a:lstStyle>
+          <a:p>
+            <a:pPr marL="0" indent="0" algn="ctr">
+              <a:buFont typeface="Arial"/>
+              <a:buNone/>
+            </a:pPr>
+            <a:r>
+              <a:rPr lang="en-GB" dirty="0" smtClean="0"/>
+              <a:t>Settings Tab</a:t>
+            </a:r>
+            <a:endParaRPr lang="en-GB" dirty="0"/>
+          </a:p>
+        </p:txBody>
+      </p:sp>
+      <p:pic>
+        <p:nvPicPr>
+          <p:cNvPr id="13" name="Picture 12"/>
+          <p:cNvPicPr>
+            <a:picLocks noChangeAspect="1"/>
+          </p:cNvPicPr>
+          <p:nvPr/>
+        </p:nvPicPr>
+        <p:blipFill>
+          <a:blip r:embed="rId5">
+            <a:extLst>
+              <a:ext uri="{28A0092B-C50C-407E-A947-70E740481C1C}">
+                <a14:useLocalDpi xmlns:a14="http://schemas.microsoft.com/office/drawing/2010/main" val="0"/>
+              </a:ext>
+            </a:extLst>
+          </a:blip>
+          <a:stretch>
+            <a:fillRect/>
+          </a:stretch>
+        </p:blipFill>
+        <p:spPr>
+          <a:xfrm>
+            <a:off x="443647" y="4053025"/>
+            <a:ext cx="4784046" cy="2691026"/>
+          </a:xfrm>
+          <a:prstGeom prst="rect">
+            <a:avLst/>
+          </a:prstGeom>
+        </p:spPr>
+      </p:pic>
+    </p:spTree>
+    <p:extLst>
+      <p:ext uri="{BB962C8B-B14F-4D97-AF65-F5344CB8AC3E}">
+        <p14:creationId xmlns:p14="http://schemas.microsoft.com/office/powerpoint/2010/main" val="3378403318"/>
+      </p:ext>
+    </p:extLst>
+  </p:cSld>
+  <p:clrMapOvr>
+    <a:masterClrMapping/>
+  </p:clrMapOvr>
+  <mc:AlternateContent xmlns:mc="http://schemas.openxmlformats.org/markup-compatibility/2006" xmlns:p14="http://schemas.microsoft.com/office/powerpoint/2010/main">
+    <mc:Choice Requires="p14">
+      <p:transition spd="med" p14:dur="700">
+        <p:fade/>
+      </p:transition>
+    </mc:Choice>
+    <mc:Fallback xmlns="">
+      <p:transition spd="med">
+        <p:fade/>
+      </p:transition>
+    </mc:Fallback>
+  </mc:AlternateContent>
+  <p:timing>
+    <p:tnLst>
+      <p:par>
+        <p:cTn id="1" dur="indefinite" restart="never" nodeType="tmRoot"/>
+      </p:par>
+    </p:tnLst>
+  </p:timing>
+</p:sld>
+</file>
+
+<file path=ppt/slides/slide12.xml><?xml version="1.0" encoding="utf-8"?>
+<p:sld xmlns:a="http://schemas.openxmlformats.org/drawingml/2006/main" xmlns:r="http://schemas.openxmlformats.org/officeDocument/2006/relationships" xmlns:p="http://schemas.openxmlformats.org/presentationml/2006/main">
+  <p:cSld>
+    <p:spTree>
+      <p:nvGrpSpPr>
+        <p:cNvPr id="1" name=""/>
+        <p:cNvGrpSpPr/>
+        <p:nvPr/>
+      </p:nvGrpSpPr>
+      <p:grpSpPr>
+        <a:xfrm>
+          <a:off x="0" y="0"/>
+          <a:ext cx="0" cy="0"/>
+          <a:chOff x="0" y="0"/>
+          <a:chExt cx="0" cy="0"/>
+        </a:xfrm>
+      </p:grpSpPr>
+      <p:sp>
+        <p:nvSpPr>
+          <p:cNvPr id="2" name="Title 1"/>
+          <p:cNvSpPr>
+            <a:spLocks noGrp="1"/>
+          </p:cNvSpPr>
+          <p:nvPr>
+            <p:ph type="title"/>
+          </p:nvPr>
+        </p:nvSpPr>
+        <p:spPr>
+          <a:xfrm>
+            <a:off x="1141413" y="101603"/>
+            <a:ext cx="9905998" cy="864973"/>
+          </a:xfrm>
+        </p:spPr>
+        <p:txBody>
+          <a:bodyPr/>
+          <a:lstStyle/>
+          <a:p>
+            <a:pPr algn="ctr"/>
+            <a:r>
+              <a:rPr lang="en-GB" dirty="0" smtClean="0"/>
+              <a:t>Conclusion</a:t>
+            </a:r>
+            <a:endParaRPr lang="en-GB" dirty="0"/>
+          </a:p>
+        </p:txBody>
+      </p:sp>
+      <p:sp>
+        <p:nvSpPr>
+          <p:cNvPr id="3" name="Content Placeholder 2"/>
+          <p:cNvSpPr>
+            <a:spLocks noGrp="1"/>
+          </p:cNvSpPr>
+          <p:nvPr>
+            <p:ph idx="1"/>
+          </p:nvPr>
+        </p:nvSpPr>
+        <p:spPr>
+          <a:xfrm>
+            <a:off x="1141413" y="1474573"/>
+            <a:ext cx="9905998" cy="4316627"/>
+          </a:xfrm>
+        </p:spPr>
+        <p:txBody>
+          <a:bodyPr/>
+          <a:lstStyle/>
+          <a:p>
+            <a:pPr marL="0" indent="0">
+              <a:buNone/>
+            </a:pPr>
+            <a:r>
+              <a:rPr lang="en-GB" dirty="0"/>
+              <a:t>We have proved</a:t>
+            </a:r>
+          </a:p>
+          <a:p>
+            <a:pPr lvl="1"/>
+            <a:r>
+              <a:rPr lang="en-GB" dirty="0"/>
+              <a:t>Efficient</a:t>
+            </a:r>
+          </a:p>
+          <a:p>
+            <a:pPr lvl="1"/>
+            <a:r>
+              <a:rPr lang="en-GB" dirty="0"/>
+              <a:t>Easily managed</a:t>
+            </a:r>
+          </a:p>
+          <a:p>
+            <a:pPr lvl="1"/>
+            <a:r>
+              <a:rPr lang="en-GB" dirty="0"/>
+              <a:t>Secure</a:t>
+            </a:r>
+          </a:p>
+          <a:p>
+            <a:pPr lvl="1"/>
+            <a:r>
+              <a:rPr lang="en-GB" dirty="0"/>
+              <a:t>Accurate statistics</a:t>
+            </a:r>
+          </a:p>
+          <a:p>
+            <a:endParaRPr lang="en-GB" dirty="0"/>
+          </a:p>
+          <a:p>
+            <a:pPr marL="0" indent="0">
+              <a:buNone/>
+            </a:pPr>
+            <a:r>
+              <a:rPr lang="en-GB" dirty="0"/>
+              <a:t>To lighten your mood:</a:t>
+            </a:r>
+          </a:p>
+          <a:p>
+            <a:pPr lvl="1"/>
+            <a:r>
+              <a:rPr lang="en-GB" dirty="0"/>
+              <a:t>I was going to tell you guys a joke about UDP, but you might not get it!</a:t>
+            </a:r>
+          </a:p>
+          <a:p>
+            <a:pPr marL="457200" lvl="1" indent="0">
+              <a:buNone/>
+            </a:pPr>
+            <a:endParaRPr lang="en-GB" dirty="0"/>
+          </a:p>
+        </p:txBody>
+      </p:sp>
+    </p:spTree>
+    <p:extLst>
+      <p:ext uri="{BB962C8B-B14F-4D97-AF65-F5344CB8AC3E}">
+        <p14:creationId xmlns:p14="http://schemas.microsoft.com/office/powerpoint/2010/main" val="2995290131"/>
+      </p:ext>
+    </p:extLst>
+  </p:cSld>
+  <p:clrMapOvr>
+    <a:masterClrMapping/>
+  </p:clrMapOvr>
+  <mc:AlternateContent xmlns:mc="http://schemas.openxmlformats.org/markup-compatibility/2006" xmlns:p14="http://schemas.microsoft.com/office/powerpoint/2010/main">
+    <mc:Choice Requires="p14">
+      <p:transition spd="med" p14:dur="700">
+        <p:fade/>
+      </p:transition>
+    </mc:Choice>
+    <mc:Fallback xmlns="">
+      <p:transition spd="med">
+        <p:fade/>
+      </p:transition>
+    </mc:Fallback>
+  </mc:AlternateContent>
+  <p:timing>
+    <p:tnLst>
+      <p:par>
+        <p:cTn id="1" dur="indefinite" restart="never" nodeType="tmRoot"/>
+      </p:par>
+    </p:tnLst>
+  </p:timing>
+</p:sld>
+</file>
+
+<file path=ppt/slides/slide13.xml><?xml version="1.0" encoding="utf-8"?>
+<p:sld xmlns:a="http://schemas.openxmlformats.org/drawingml/2006/main" xmlns:r="http://schemas.openxmlformats.org/officeDocument/2006/relationships" xmlns:p="http://schemas.openxmlformats.org/presentationml/2006/main">
+  <p:cSld>
+    <p:spTree>
+      <p:nvGrpSpPr>
+        <p:cNvPr id="1" name=""/>
+        <p:cNvGrpSpPr/>
+        <p:nvPr/>
+      </p:nvGrpSpPr>
+      <p:grpSpPr>
+        <a:xfrm>
+          <a:off x="0" y="0"/>
+          <a:ext cx="0" cy="0"/>
+          <a:chOff x="0" y="0"/>
+          <a:chExt cx="0" cy="0"/>
+        </a:xfrm>
+      </p:grpSpPr>
+      <p:sp>
+        <p:nvSpPr>
+          <p:cNvPr id="2" name="Title 1"/>
+          <p:cNvSpPr>
+            <a:spLocks noGrp="1"/>
+          </p:cNvSpPr>
+          <p:nvPr>
+            <p:ph type="title"/>
+          </p:nvPr>
+        </p:nvSpPr>
+        <p:spPr>
+          <a:xfrm>
+            <a:off x="1141413" y="101603"/>
+            <a:ext cx="9905998" cy="864973"/>
+          </a:xfrm>
+        </p:spPr>
+        <p:txBody>
+          <a:bodyPr/>
+          <a:lstStyle/>
+          <a:p>
+            <a:pPr algn="ctr"/>
+            <a:r>
+              <a:rPr lang="en-GB" dirty="0" smtClean="0"/>
+              <a:t>References</a:t>
+            </a:r>
+            <a:endParaRPr lang="en-GB" dirty="0"/>
+          </a:p>
+        </p:txBody>
+      </p:sp>
+      <p:sp>
+        <p:nvSpPr>
+          <p:cNvPr id="3" name="Content Placeholder 2"/>
+          <p:cNvSpPr>
+            <a:spLocks noGrp="1"/>
+          </p:cNvSpPr>
+          <p:nvPr>
+            <p:ph idx="1"/>
+          </p:nvPr>
+        </p:nvSpPr>
+        <p:spPr>
+          <a:xfrm>
+            <a:off x="1141413" y="1474573"/>
+            <a:ext cx="9905998" cy="4316627"/>
+          </a:xfrm>
+        </p:spPr>
+        <p:txBody>
+          <a:bodyPr/>
+          <a:lstStyle/>
+          <a:p>
+            <a:pPr marL="457200" lvl="1" indent="0">
+              <a:buNone/>
+            </a:pPr>
+            <a:r>
+              <a:rPr lang="en-GB" dirty="0" smtClean="0"/>
+              <a:t>Inspiration:</a:t>
+            </a:r>
+          </a:p>
+          <a:p>
+            <a:pPr lvl="2"/>
+            <a:r>
+              <a:rPr lang="en-GB" dirty="0" smtClean="0"/>
+              <a:t>Nagios </a:t>
+            </a:r>
+            <a:r>
+              <a:rPr lang="en-GB" dirty="0"/>
+              <a:t>Enterprises, </a:t>
+            </a:r>
+            <a:r>
+              <a:rPr lang="en-GB" dirty="0" smtClean="0"/>
+              <a:t>LLC (2015) </a:t>
+            </a:r>
+            <a:r>
+              <a:rPr lang="en-GB" i="1" dirty="0"/>
+              <a:t>Nagios core. Nagios open source project</a:t>
+            </a:r>
+            <a:r>
+              <a:rPr lang="en-GB" dirty="0"/>
+              <a:t>. Available at: https://www.nagios.org/ (Accessed: 24 November 2015</a:t>
+            </a:r>
+            <a:r>
+              <a:rPr lang="en-GB" dirty="0" smtClean="0"/>
+              <a:t>).</a:t>
+            </a:r>
+          </a:p>
+          <a:p>
+            <a:pPr marL="457200" lvl="1" indent="0">
+              <a:buNone/>
+            </a:pPr>
+            <a:r>
+              <a:rPr lang="en-GB" dirty="0" smtClean="0"/>
+              <a:t>Use Case</a:t>
+            </a:r>
+          </a:p>
+          <a:p>
+            <a:pPr lvl="2"/>
+            <a:r>
+              <a:rPr lang="en-GB" i="1" dirty="0"/>
+              <a:t>Use case</a:t>
+            </a:r>
+            <a:r>
+              <a:rPr lang="en-GB" dirty="0"/>
+              <a:t> (2015) in </a:t>
+            </a:r>
+            <a:r>
+              <a:rPr lang="en-GB" i="1" dirty="0"/>
+              <a:t>Wikipedia</a:t>
+            </a:r>
+            <a:r>
+              <a:rPr lang="en-GB" dirty="0"/>
+              <a:t>. Available at: https://en.wikipedia.org/wiki/Use_case (Accessed: </a:t>
+            </a:r>
+            <a:r>
+              <a:rPr lang="en-GB" dirty="0" smtClean="0"/>
+              <a:t>27 November </a:t>
+            </a:r>
+            <a:r>
+              <a:rPr lang="en-GB" dirty="0"/>
+              <a:t>2015</a:t>
+            </a:r>
+            <a:r>
+              <a:rPr lang="en-GB" dirty="0" smtClean="0"/>
+              <a:t>).</a:t>
+            </a:r>
+          </a:p>
+          <a:p>
+            <a:pPr marL="457200" lvl="1" indent="0">
+              <a:buNone/>
+            </a:pPr>
+            <a:r>
+              <a:rPr lang="en-GB" dirty="0" smtClean="0"/>
+              <a:t>Conclusion - Joke</a:t>
+            </a:r>
+          </a:p>
+          <a:p>
+            <a:pPr lvl="2"/>
+            <a:r>
+              <a:rPr lang="en-GB" i="1" dirty="0" smtClean="0"/>
+              <a:t>I Was </a:t>
+            </a:r>
+            <a:r>
+              <a:rPr lang="en-GB" i="1" dirty="0" err="1"/>
+              <a:t>Gonna</a:t>
+            </a:r>
+            <a:r>
+              <a:rPr lang="en-GB" i="1" dirty="0"/>
+              <a:t> Tell You Guys A Joke About UDP</a:t>
+            </a:r>
+            <a:r>
+              <a:rPr lang="en-GB" dirty="0"/>
+              <a:t> (2012) Available at: https://www.reddit.com/r/ProgrammerHumor/comments/14wv9p/i_was_gonna_tell_you_guys_a_joke_about_udp/ (Accessed: </a:t>
+            </a:r>
+            <a:r>
+              <a:rPr lang="en-GB" dirty="0" smtClean="0"/>
+              <a:t> 30 November </a:t>
+            </a:r>
+            <a:r>
+              <a:rPr lang="en-GB" dirty="0"/>
+              <a:t>2015)</a:t>
+            </a:r>
+          </a:p>
+        </p:txBody>
+      </p:sp>
+    </p:spTree>
+    <p:extLst>
+      <p:ext uri="{BB962C8B-B14F-4D97-AF65-F5344CB8AC3E}">
+        <p14:creationId xmlns:p14="http://schemas.microsoft.com/office/powerpoint/2010/main" val="593146971"/>
+      </p:ext>
+    </p:extLst>
+  </p:cSld>
+  <p:clrMapOvr>
+    <a:masterClrMapping/>
+  </p:clrMapOvr>
+  <mc:AlternateContent xmlns:mc="http://schemas.openxmlformats.org/markup-compatibility/2006" xmlns:p14="http://schemas.microsoft.com/office/powerpoint/2010/main">
+    <mc:Choice Requires="p14">
+      <p:transition spd="med" p14:dur="700">
+        <p:fade/>
+      </p:transition>
+    </mc:Choice>
+    <mc:Fallback xmlns="">
+      <p:transition spd="med">
+        <p:fade/>
+      </p:transition>
+    </mc:Fallback>
+  </mc:AlternateContent>
   <p:timing>
     <p:tnLst>
       <p:par>
@@ -6008,7 +8758,7 @@
         </p:nvSpPr>
         <p:spPr>
           <a:xfrm>
-            <a:off x="1141413" y="609600"/>
+            <a:off x="1141413" y="101603"/>
             <a:ext cx="9905998" cy="864973"/>
           </a:xfrm>
         </p:spPr>
@@ -6045,14 +8795,38 @@
           <a:bodyPr/>
           <a:lstStyle/>
           <a:p>
-            <a:endParaRPr lang="en-GB" smtClean="0">
-              <a:latin typeface="Calibri Light" panose="020F0302020204030204" pitchFamily="34" charset="0"/>
-            </a:endParaRPr>
-          </a:p>
-          <a:p>
-            <a:endParaRPr lang="en-GB" dirty="0">
-              <a:latin typeface="Calibri Light" panose="020F0302020204030204" pitchFamily="34" charset="0"/>
-            </a:endParaRPr>
+            <a:r>
+              <a:rPr lang="en-GB" dirty="0"/>
+              <a:t>Our aims:</a:t>
+            </a:r>
+          </a:p>
+          <a:p>
+            <a:pPr lvl="1"/>
+            <a:r>
+              <a:rPr lang="en-GB" dirty="0"/>
+              <a:t>Stable program</a:t>
+            </a:r>
+          </a:p>
+          <a:p>
+            <a:pPr lvl="1"/>
+            <a:r>
+              <a:rPr lang="en-GB" dirty="0"/>
+              <a:t>Efficient interface</a:t>
+            </a:r>
+          </a:p>
+          <a:p>
+            <a:pPr lvl="1"/>
+            <a:r>
+              <a:rPr lang="en-GB" dirty="0"/>
+              <a:t>Multiple users</a:t>
+            </a:r>
+          </a:p>
+          <a:p>
+            <a:pPr lvl="1"/>
+            <a:r>
+              <a:rPr lang="en-GB" dirty="0"/>
+              <a:t>Security management</a:t>
+            </a:r>
           </a:p>
         </p:txBody>
       </p:sp>
@@ -6066,6 +8840,18 @@
   <p:clrMapOvr>
     <a:masterClrMapping/>
   </p:clrMapOvr>
+  <mc:AlternateContent xmlns:mc="http://schemas.openxmlformats.org/markup-compatibility/2006" xmlns:p14="http://schemas.microsoft.com/office/powerpoint/2010/main">
+    <mc:Choice Requires="p14">
+      <p:transition spd="med" p14:dur="700">
+        <p:fade/>
+      </p:transition>
+    </mc:Choice>
+    <mc:Fallback xmlns="">
+      <p:transition spd="med">
+        <p:fade/>
+      </p:transition>
+    </mc:Fallback>
+  </mc:AlternateContent>
   <p:timing>
     <p:tnLst>
       <p:par>
@@ -6095,7 +8881,7 @@
       </p:grpSpPr>
       <p:sp>
         <p:nvSpPr>
-          <p:cNvPr id="2" name="Title 1"/>
+          <p:cNvPr id="4" name="Title 1"/>
           <p:cNvSpPr>
             <a:spLocks noGrp="1"/>
           </p:cNvSpPr>
@@ -6103,18 +8889,28 @@
             <p:ph type="title"/>
           </p:nvPr>
         </p:nvSpPr>
-        <p:spPr/>
+        <p:spPr>
+          <a:xfrm>
+            <a:off x="1141413" y="101603"/>
+            <a:ext cx="9905998" cy="864973"/>
+          </a:xfrm>
+        </p:spPr>
         <p:txBody>
           <a:bodyPr/>
           <a:lstStyle/>
           <a:p>
-            <a:endParaRPr lang="en-GB"/>
-          </a:p>
-        </p:txBody>
-      </p:sp>
-      <p:sp>
-        <p:nvSpPr>
-          <p:cNvPr id="3" name="Content Placeholder 2"/>
+            <a:pPr algn="ctr"/>
+            <a:r>
+              <a:rPr lang="en-GB" dirty="0" smtClean="0"/>
+              <a:t>The Scope</a:t>
+            </a:r>
+            <a:endParaRPr lang="en-GB" dirty="0"/>
+          </a:p>
+        </p:txBody>
+      </p:sp>
+      <p:sp>
+        <p:nvSpPr>
+          <p:cNvPr id="6" name="Content Placeholder 2"/>
           <p:cNvSpPr>
             <a:spLocks noGrp="1"/>
           </p:cNvSpPr>
@@ -6122,15 +8918,81 @@
             <p:ph idx="1"/>
           </p:nvPr>
         </p:nvSpPr>
-        <p:spPr/>
+        <p:spPr>
+          <a:xfrm>
+            <a:off x="5164667" y="1474573"/>
+            <a:ext cx="5882744" cy="4316627"/>
+          </a:xfrm>
+        </p:spPr>
         <p:txBody>
           <a:bodyPr/>
           <a:lstStyle/>
           <a:p>
-            <a:endParaRPr lang="en-GB"/>
-          </a:p>
-        </p:txBody>
-      </p:sp>
+            <a:pPr marL="0" indent="0">
+              <a:buNone/>
+            </a:pPr>
+            <a:r>
+              <a:rPr lang="en-GB" dirty="0"/>
+              <a:t>Represents who the program affects directly and </a:t>
+            </a:r>
+            <a:r>
+              <a:rPr lang="en-GB" dirty="0" smtClean="0"/>
+              <a:t>indirectly.</a:t>
+            </a:r>
+          </a:p>
+          <a:p>
+            <a:pPr lvl="1"/>
+            <a:r>
+              <a:rPr lang="en-GB" dirty="0" smtClean="0"/>
+              <a:t>Directly </a:t>
+            </a:r>
+            <a:r>
+              <a:rPr lang="en-GB" dirty="0"/>
+              <a:t>– users</a:t>
+            </a:r>
+          </a:p>
+          <a:p>
+            <a:pPr lvl="1">
+              <a:buFont typeface="Arial" panose="020B0604020202020204" pitchFamily="34" charset="0"/>
+              <a:buChar char="•"/>
+            </a:pPr>
+            <a:r>
+              <a:rPr lang="en-GB" dirty="0"/>
+              <a:t>Indirectly – hardware manufacturers</a:t>
+            </a:r>
+          </a:p>
+        </p:txBody>
+      </p:sp>
+      <p:pic>
+        <p:nvPicPr>
+          <p:cNvPr id="8" name="Content Placeholder 3"/>
+          <p:cNvPicPr>
+            <a:picLocks noChangeAspect="1"/>
+          </p:cNvPicPr>
+          <p:nvPr/>
+        </p:nvPicPr>
+        <p:blipFill>
+          <a:blip r:embed="rId2">
+            <a:extLst>
+              <a:ext uri="{28A0092B-C50C-407E-A947-70E740481C1C}">
+                <a14:useLocalDpi xmlns:a14="http://schemas.microsoft.com/office/drawing/2010/main" val="0"/>
+              </a:ext>
+            </a:extLst>
+          </a:blip>
+          <a:stretch>
+            <a:fillRect/>
+          </a:stretch>
+        </p:blipFill>
+        <p:spPr>
+          <a:xfrm>
+            <a:off x="516466" y="1757892"/>
+            <a:ext cx="4351338" cy="4351338"/>
+          </a:xfrm>
+          <a:prstGeom prst="rect">
+            <a:avLst/>
+          </a:prstGeom>
+        </p:spPr>
+      </p:pic>
     </p:spTree>
     <p:extLst>
       <p:ext uri="{BB962C8B-B14F-4D97-AF65-F5344CB8AC3E}">
@@ -6141,6 +9003,18 @@
   <p:clrMapOvr>
     <a:masterClrMapping/>
   </p:clrMapOvr>
+  <mc:AlternateContent xmlns:mc="http://schemas.openxmlformats.org/markup-compatibility/2006" xmlns:p14="http://schemas.microsoft.com/office/powerpoint/2010/main">
+    <mc:Choice Requires="p14">
+      <p:transition spd="med" p14:dur="700">
+        <p:fade/>
+      </p:transition>
+    </mc:Choice>
+    <mc:Fallback xmlns="">
+      <p:transition spd="med">
+        <p:fade/>
+      </p:transition>
+    </mc:Fallback>
+  </mc:AlternateContent>
   <p:timing>
     <p:tnLst>
       <p:par>
@@ -6170,7 +9044,7 @@
       </p:grpSpPr>
       <p:sp>
         <p:nvSpPr>
-          <p:cNvPr id="2" name="Title 1"/>
+          <p:cNvPr id="4" name="Title 1"/>
           <p:cNvSpPr>
             <a:spLocks noGrp="1"/>
           </p:cNvSpPr>
@@ -6178,18 +9052,28 @@
             <p:ph type="title"/>
           </p:nvPr>
         </p:nvSpPr>
-        <p:spPr/>
+        <p:spPr>
+          <a:xfrm>
+            <a:off x="1141413" y="101602"/>
+            <a:ext cx="9905998" cy="864973"/>
+          </a:xfrm>
+        </p:spPr>
         <p:txBody>
           <a:bodyPr/>
           <a:lstStyle/>
           <a:p>
-            <a:endParaRPr lang="en-GB"/>
-          </a:p>
-        </p:txBody>
-      </p:sp>
-      <p:sp>
-        <p:nvSpPr>
-          <p:cNvPr id="3" name="Content Placeholder 2"/>
+            <a:pPr algn="ctr"/>
+            <a:r>
+              <a:rPr lang="en-GB" dirty="0" smtClean="0"/>
+              <a:t>Context</a:t>
+            </a:r>
+            <a:endParaRPr lang="en-GB" dirty="0"/>
+          </a:p>
+        </p:txBody>
+      </p:sp>
+      <p:sp>
+        <p:nvSpPr>
+          <p:cNvPr id="6" name="Content Placeholder 2"/>
           <p:cNvSpPr>
             <a:spLocks noGrp="1"/>
           </p:cNvSpPr>
@@ -6197,25 +9081,105 @@
             <p:ph idx="1"/>
           </p:nvPr>
         </p:nvSpPr>
-        <p:spPr/>
-        <p:txBody>
-          <a:bodyPr/>
+        <p:spPr>
+          <a:xfrm>
+            <a:off x="8872152" y="1474573"/>
+            <a:ext cx="3065848" cy="4316627"/>
+          </a:xfrm>
+        </p:spPr>
+        <p:txBody>
+          <a:bodyPr>
+            <a:normAutofit/>
+          </a:bodyPr>
           <a:lstStyle/>
           <a:p>
-            <a:endParaRPr lang="en-GB"/>
-          </a:p>
-        </p:txBody>
-      </p:sp>
+            <a:pPr marL="0" indent="0">
+              <a:buNone/>
+            </a:pPr>
+            <a:r>
+              <a:rPr lang="en-GB" dirty="0"/>
+              <a:t>How our program will interact with it’s </a:t>
+            </a:r>
+            <a:r>
+              <a:rPr lang="en-GB" dirty="0" smtClean="0"/>
+              <a:t>environment.</a:t>
+            </a:r>
+          </a:p>
+          <a:p>
+            <a:pPr lvl="1"/>
+            <a:r>
+              <a:rPr lang="en-GB" dirty="0" smtClean="0"/>
+              <a:t>Arrows </a:t>
+            </a:r>
+            <a:r>
+              <a:rPr lang="en-GB" dirty="0"/>
+              <a:t>going towards centre – environment to program</a:t>
+            </a:r>
+          </a:p>
+          <a:p>
+            <a:pPr lvl="1">
+              <a:buFont typeface="Arial" panose="020B0604020202020204" pitchFamily="34" charset="0"/>
+              <a:buChar char="•"/>
+            </a:pPr>
+            <a:r>
+              <a:rPr lang="en-GB" dirty="0"/>
+              <a:t>Arrows going away from centre – program outputting specific requirements</a:t>
+            </a:r>
+          </a:p>
+        </p:txBody>
+      </p:sp>
+      <p:pic>
+        <p:nvPicPr>
+          <p:cNvPr id="5" name="Content Placeholder 3"/>
+          <p:cNvPicPr>
+            <a:picLocks noChangeAspect="1"/>
+          </p:cNvPicPr>
+          <p:nvPr/>
+        </p:nvPicPr>
+        <p:blipFill>
+          <a:blip r:embed="rId2">
+            <a:extLst>
+              <a:ext uri="{28A0092B-C50C-407E-A947-70E740481C1C}">
+                <a14:useLocalDpi xmlns:a14="http://schemas.microsoft.com/office/drawing/2010/main" val="0"/>
+              </a:ext>
+            </a:extLst>
+          </a:blip>
+          <a:stretch>
+            <a:fillRect/>
+          </a:stretch>
+        </p:blipFill>
+        <p:spPr>
+          <a:xfrm>
+            <a:off x="735926" y="1474573"/>
+            <a:ext cx="7934832" cy="4606272"/>
+          </a:xfrm>
+          <a:prstGeom prst="rect">
+            <a:avLst/>
+          </a:prstGeom>
+        </p:spPr>
+      </p:pic>
     </p:spTree>
     <p:extLst>
       <p:ext uri="{BB962C8B-B14F-4D97-AF65-F5344CB8AC3E}">
-        <p14:creationId xmlns:p14="http://schemas.microsoft.com/office/powerpoint/2010/main" val="3657854920"/>
+        <p14:creationId xmlns:p14="http://schemas.microsoft.com/office/powerpoint/2010/main" val="1882435632"/>
       </p:ext>
     </p:extLst>
   </p:cSld>
   <p:clrMapOvr>
     <a:masterClrMapping/>
   </p:clrMapOvr>
+  <mc:AlternateContent xmlns:mc="http://schemas.openxmlformats.org/markup-compatibility/2006" xmlns:p14="http://schemas.microsoft.com/office/powerpoint/2010/main">
+    <mc:Choice Requires="p14">
+      <p:transition spd="med" p14:dur="700">
+        <p:fade/>
+      </p:transition>
+    </mc:Choice>
+    <mc:Fallback xmlns="">
+      <p:transition spd="med">
+        <p:fade/>
+      </p:transition>
+    </mc:Fallback>
+  </mc:AlternateContent>
   <p:timing>
     <p:tnLst>
       <p:par>
@@ -6245,7 +9209,7 @@
       </p:grpSpPr>
       <p:sp>
         <p:nvSpPr>
-          <p:cNvPr id="2" name="Title 1"/>
+          <p:cNvPr id="4" name="Title 1"/>
           <p:cNvSpPr>
             <a:spLocks noGrp="1"/>
           </p:cNvSpPr>
@@ -6253,18 +9217,28 @@
             <p:ph type="title"/>
           </p:nvPr>
         </p:nvSpPr>
-        <p:spPr/>
+        <p:spPr>
+          <a:xfrm>
+            <a:off x="1141413" y="84664"/>
+            <a:ext cx="9905998" cy="864973"/>
+          </a:xfrm>
+        </p:spPr>
         <p:txBody>
           <a:bodyPr/>
           <a:lstStyle/>
           <a:p>
-            <a:endParaRPr lang="en-GB"/>
-          </a:p>
-        </p:txBody>
-      </p:sp>
-      <p:sp>
-        <p:nvSpPr>
-          <p:cNvPr id="3" name="Content Placeholder 2"/>
+            <a:pPr algn="ctr"/>
+            <a:r>
+              <a:rPr lang="en-GB" dirty="0" smtClean="0"/>
+              <a:t>Use Case</a:t>
+            </a:r>
+            <a:endParaRPr lang="en-GB" dirty="0"/>
+          </a:p>
+        </p:txBody>
+      </p:sp>
+      <p:sp>
+        <p:nvSpPr>
+          <p:cNvPr id="6" name="Content Placeholder 2"/>
           <p:cNvSpPr>
             <a:spLocks noGrp="1"/>
           </p:cNvSpPr>
@@ -6272,25 +9246,103 @@
             <p:ph idx="1"/>
           </p:nvPr>
         </p:nvSpPr>
-        <p:spPr/>
+        <p:spPr>
+          <a:xfrm>
+            <a:off x="8123491" y="1474573"/>
+            <a:ext cx="3848373" cy="4316627"/>
+          </a:xfrm>
+        </p:spPr>
         <p:txBody>
           <a:bodyPr/>
           <a:lstStyle/>
           <a:p>
-            <a:endParaRPr lang="en-GB"/>
-          </a:p>
-        </p:txBody>
-      </p:sp>
+            <a:pPr marL="0" indent="0">
+              <a:buNone/>
+            </a:pPr>
+            <a:r>
+              <a:rPr lang="en-GB" dirty="0"/>
+              <a:t>How the actors and the system interact with one another</a:t>
+            </a:r>
+          </a:p>
+          <a:p>
+            <a:pPr lvl="1">
+              <a:buFont typeface="Arial" panose="020B0604020202020204" pitchFamily="34" charset="0"/>
+              <a:buChar char="•"/>
+            </a:pPr>
+            <a:r>
+              <a:rPr lang="en-GB" dirty="0"/>
+              <a:t>Admin/System can perform all functions including edit/save settings</a:t>
+            </a:r>
+          </a:p>
+          <a:p>
+            <a:pPr lvl="1">
+              <a:buFont typeface="Arial" panose="020B0604020202020204" pitchFamily="34" charset="0"/>
+              <a:buChar char="•"/>
+            </a:pPr>
+            <a:r>
+              <a:rPr lang="en-GB" dirty="0"/>
+              <a:t>User is limited to core </a:t>
+            </a:r>
+            <a:r>
+              <a:rPr lang="en-GB" dirty="0" smtClean="0"/>
+              <a:t>functions. Excludes save/ edit settings</a:t>
+            </a:r>
+            <a:endParaRPr lang="en-GB" dirty="0"/>
+          </a:p>
+        </p:txBody>
+      </p:sp>
+      <p:pic>
+        <p:nvPicPr>
+          <p:cNvPr id="7" name="Content Placeholder 4"/>
+          <p:cNvPicPr>
+            <a:picLocks noChangeAspect="1"/>
+          </p:cNvPicPr>
+          <p:nvPr/>
+        </p:nvPicPr>
+        <p:blipFill>
+          <a:blip r:embed="rId2" cstate="print">
+            <a:extLst>
+              <a:ext uri="{28A0092B-C50C-407E-A947-70E740481C1C}">
+                <a14:useLocalDpi xmlns:a14="http://schemas.microsoft.com/office/drawing/2010/main" val="0"/>
+              </a:ext>
+            </a:extLst>
+          </a:blip>
+          <a:stretch>
+            <a:fillRect/>
+          </a:stretch>
+        </p:blipFill>
+        <p:spPr>
+          <a:xfrm>
+            <a:off x="838200" y="1474573"/>
+            <a:ext cx="7183694" cy="5079503"/>
+          </a:xfrm>
+          <a:prstGeom prst="rect">
+            <a:avLst/>
+          </a:prstGeom>
+        </p:spPr>
+      </p:pic>
     </p:spTree>
     <p:extLst>
       <p:ext uri="{BB962C8B-B14F-4D97-AF65-F5344CB8AC3E}">
-        <p14:creationId xmlns:p14="http://schemas.microsoft.com/office/powerpoint/2010/main" val="3066143877"/>
+        <p14:creationId xmlns:p14="http://schemas.microsoft.com/office/powerpoint/2010/main" val="2681095656"/>
       </p:ext>
     </p:extLst>
   </p:cSld>
   <p:clrMapOvr>
     <a:masterClrMapping/>
   </p:clrMapOvr>
+  <mc:AlternateContent xmlns:mc="http://schemas.openxmlformats.org/markup-compatibility/2006" xmlns:p14="http://schemas.microsoft.com/office/powerpoint/2010/main">
+    <mc:Choice Requires="p14">
+      <p:transition spd="med" p14:dur="700">
+        <p:fade/>
+      </p:transition>
+    </mc:Choice>
+    <mc:Fallback xmlns="">
+      <p:transition spd="med">
+        <p:fade/>
+      </p:transition>
+    </mc:Fallback>
+  </mc:AlternateContent>
   <p:timing>
     <p:tnLst>
       <p:par>
@@ -6320,7 +9372,7 @@
       </p:grpSpPr>
       <p:sp>
         <p:nvSpPr>
-          <p:cNvPr id="2" name="Title 1"/>
+          <p:cNvPr id="4" name="Title 1"/>
           <p:cNvSpPr>
             <a:spLocks noGrp="1"/>
           </p:cNvSpPr>
@@ -6328,18 +9380,27 @@
             <p:ph type="title"/>
           </p:nvPr>
         </p:nvSpPr>
-        <p:spPr/>
+        <p:spPr>
+          <a:xfrm>
+            <a:off x="1141413" y="101603"/>
+            <a:ext cx="9905998" cy="864973"/>
+          </a:xfrm>
+        </p:spPr>
         <p:txBody>
           <a:bodyPr/>
           <a:lstStyle/>
           <a:p>
-            <a:endParaRPr lang="en-GB"/>
-          </a:p>
-        </p:txBody>
-      </p:sp>
-      <p:sp>
-        <p:nvSpPr>
-          <p:cNvPr id="3" name="Content Placeholder 2"/>
+            <a:pPr algn="ctr"/>
+            <a:r>
+              <a:rPr lang="en-GB" dirty="0"/>
+              <a:t>Sequence Diagram User</a:t>
+            </a:r>
+          </a:p>
+        </p:txBody>
+      </p:sp>
+      <p:sp>
+        <p:nvSpPr>
+          <p:cNvPr id="6" name="Content Placeholder 2"/>
           <p:cNvSpPr>
             <a:spLocks noGrp="1"/>
           </p:cNvSpPr>
@@ -6347,25 +9408,93 @@
             <p:ph idx="1"/>
           </p:nvPr>
         </p:nvSpPr>
-        <p:spPr/>
-        <p:txBody>
-          <a:bodyPr/>
+        <p:spPr>
+          <a:xfrm>
+            <a:off x="1141413" y="5825066"/>
+            <a:ext cx="9905998" cy="897466"/>
+          </a:xfrm>
+        </p:spPr>
+        <p:txBody>
+          <a:bodyPr>
+            <a:normAutofit/>
+          </a:bodyPr>
           <a:lstStyle/>
           <a:p>
-            <a:endParaRPr lang="en-GB"/>
-          </a:p>
-        </p:txBody>
-      </p:sp>
+            <a:pPr marL="0" indent="0">
+              <a:buNone/>
+            </a:pPr>
+            <a:r>
+              <a:rPr lang="en-GB" dirty="0"/>
+              <a:t>Standard user objects and their interactions</a:t>
+            </a:r>
+          </a:p>
+          <a:p>
+            <a:pPr lvl="1">
+              <a:buFont typeface="Arial" panose="020B0604020202020204" pitchFamily="34" charset="0"/>
+              <a:buChar char="•"/>
+            </a:pPr>
+            <a:r>
+              <a:rPr lang="en-GB" dirty="0"/>
+              <a:t>Objects message other objects to perform functions</a:t>
+            </a:r>
+          </a:p>
+          <a:p>
+            <a:endParaRPr lang="en-GB" dirty="0"/>
+          </a:p>
+        </p:txBody>
+      </p:sp>
+      <p:pic>
+        <p:nvPicPr>
+          <p:cNvPr id="5" name="Content Placeholder 6"/>
+          <p:cNvPicPr>
+            <a:picLocks noChangeAspect="1"/>
+          </p:cNvPicPr>
+          <p:nvPr/>
+        </p:nvPicPr>
+        <p:blipFill>
+          <a:blip r:embed="rId2">
+            <a:extLst>
+              <a:ext uri="{28A0092B-C50C-407E-A947-70E740481C1C}">
+                <a14:useLocalDpi xmlns:a14="http://schemas.microsoft.com/office/drawing/2010/main" val="0"/>
+              </a:ext>
+            </a:extLst>
+          </a:blip>
+          <a:stretch>
+            <a:fillRect/>
+          </a:stretch>
+        </p:blipFill>
+        <p:spPr>
+          <a:xfrm>
+            <a:off x="1177291" y="1102042"/>
+            <a:ext cx="9897111" cy="4555926"/>
+          </a:xfrm>
+          <a:prstGeom prst="rect">
+            <a:avLst/>
+          </a:prstGeom>
+        </p:spPr>
+      </p:pic>
     </p:spTree>
     <p:extLst>
       <p:ext uri="{BB962C8B-B14F-4D97-AF65-F5344CB8AC3E}">
-        <p14:creationId xmlns:p14="http://schemas.microsoft.com/office/powerpoint/2010/main" val="1502102697"/>
+        <p14:creationId xmlns:p14="http://schemas.microsoft.com/office/powerpoint/2010/main" val="2512952316"/>
       </p:ext>
     </p:extLst>
   </p:cSld>
   <p:clrMapOvr>
     <a:masterClrMapping/>
   </p:clrMapOvr>
+  <mc:AlternateContent xmlns:mc="http://schemas.openxmlformats.org/markup-compatibility/2006" xmlns:p14="http://schemas.microsoft.com/office/powerpoint/2010/main">
+    <mc:Choice Requires="p14">
+      <p:transition spd="med" p14:dur="700">
+        <p:fade/>
+      </p:transition>
+    </mc:Choice>
+    <mc:Fallback xmlns="">
+      <p:transition spd="med">
+        <p:fade/>
+      </p:transition>
+    </mc:Fallback>
+  </mc:AlternateContent>
   <p:timing>
     <p:tnLst>
       <p:par>
@@ -6395,7 +9524,7 @@
       </p:grpSpPr>
       <p:sp>
         <p:nvSpPr>
-          <p:cNvPr id="2" name="Title 1"/>
+          <p:cNvPr id="4" name="Title 1"/>
           <p:cNvSpPr>
             <a:spLocks noGrp="1"/>
           </p:cNvSpPr>
@@ -6403,18 +9532,32 @@
             <p:ph type="title"/>
           </p:nvPr>
         </p:nvSpPr>
-        <p:spPr/>
+        <p:spPr>
+          <a:xfrm>
+            <a:off x="1141413" y="101603"/>
+            <a:ext cx="9905998" cy="864973"/>
+          </a:xfrm>
+        </p:spPr>
         <p:txBody>
           <a:bodyPr/>
           <a:lstStyle/>
           <a:p>
-            <a:endParaRPr lang="en-GB"/>
-          </a:p>
-        </p:txBody>
-      </p:sp>
-      <p:sp>
-        <p:nvSpPr>
-          <p:cNvPr id="3" name="Content Placeholder 2"/>
+            <a:pPr algn="ctr"/>
+            <a:r>
+              <a:rPr lang="en-GB" dirty="0"/>
+              <a:t>Sequence Diagram </a:t>
+            </a:r>
+            <a:r>
+              <a:rPr lang="en-GB" dirty="0" smtClean="0"/>
+              <a:t>Administrator</a:t>
+            </a:r>
+            <a:endParaRPr lang="en-GB" dirty="0"/>
+          </a:p>
+        </p:txBody>
+      </p:sp>
+      <p:sp>
+        <p:nvSpPr>
+          <p:cNvPr id="6" name="Content Placeholder 2"/>
           <p:cNvSpPr>
             <a:spLocks noGrp="1"/>
           </p:cNvSpPr>
@@ -6422,25 +9565,90 @@
             <p:ph idx="1"/>
           </p:nvPr>
         </p:nvSpPr>
-        <p:spPr/>
-        <p:txBody>
-          <a:bodyPr/>
+        <p:spPr>
+          <a:xfrm>
+            <a:off x="1141413" y="5554133"/>
+            <a:ext cx="9905998" cy="897466"/>
+          </a:xfrm>
+        </p:spPr>
+        <p:txBody>
+          <a:bodyPr>
+            <a:normAutofit/>
+          </a:bodyPr>
           <a:lstStyle/>
           <a:p>
-            <a:endParaRPr lang="en-GB"/>
-          </a:p>
-        </p:txBody>
-      </p:sp>
+            <a:pPr marL="0" indent="0">
+              <a:buNone/>
+            </a:pPr>
+            <a:r>
+              <a:rPr lang="en-GB" dirty="0"/>
+              <a:t>Administrator user objects and their interactions</a:t>
+            </a:r>
+          </a:p>
+          <a:p>
+            <a:pPr lvl="1">
+              <a:buFont typeface="Arial" panose="020B0604020202020204" pitchFamily="34" charset="0"/>
+              <a:buChar char="•"/>
+            </a:pPr>
+            <a:r>
+              <a:rPr lang="en-GB" dirty="0"/>
+              <a:t>More class/objects as they have more control</a:t>
+            </a:r>
+          </a:p>
+        </p:txBody>
+      </p:sp>
+      <p:pic>
+        <p:nvPicPr>
+          <p:cNvPr id="7" name="Content Placeholder 6"/>
+          <p:cNvPicPr>
+            <a:picLocks noChangeAspect="1"/>
+          </p:cNvPicPr>
+          <p:nvPr/>
+        </p:nvPicPr>
+        <p:blipFill>
+          <a:blip r:embed="rId2">
+            <a:extLst>
+              <a:ext uri="{28A0092B-C50C-407E-A947-70E740481C1C}">
+                <a14:useLocalDpi xmlns:a14="http://schemas.microsoft.com/office/drawing/2010/main" val="0"/>
+              </a:ext>
+            </a:extLst>
+          </a:blip>
+          <a:stretch>
+            <a:fillRect/>
+          </a:stretch>
+        </p:blipFill>
+        <p:spPr>
+          <a:xfrm>
+            <a:off x="347558" y="988542"/>
+            <a:ext cx="11582212" cy="4364508"/>
+          </a:xfrm>
+          <a:prstGeom prst="rect">
+            <a:avLst/>
+          </a:prstGeom>
+        </p:spPr>
+      </p:pic>
     </p:spTree>
     <p:extLst>
       <p:ext uri="{BB962C8B-B14F-4D97-AF65-F5344CB8AC3E}">
-        <p14:creationId xmlns:p14="http://schemas.microsoft.com/office/powerpoint/2010/main" val="308182603"/>
+        <p14:creationId xmlns:p14="http://schemas.microsoft.com/office/powerpoint/2010/main" val="1295653931"/>
       </p:ext>
     </p:extLst>
   </p:cSld>
   <p:clrMapOvr>
     <a:masterClrMapping/>
   </p:clrMapOvr>
+  <mc:AlternateContent xmlns:mc="http://schemas.openxmlformats.org/markup-compatibility/2006" xmlns:p14="http://schemas.microsoft.com/office/powerpoint/2010/main">
+    <mc:Choice Requires="p14">
+      <p:transition spd="med" p14:dur="700">
+        <p:fade/>
+      </p:transition>
+    </mc:Choice>
+    <mc:Fallback xmlns="">
+      <p:transition spd="med">
+        <p:fade/>
+      </p:transition>
+    </mc:Fallback>
+  </mc:AlternateContent>
   <p:timing>
     <p:tnLst>
       <p:par>
@@ -6478,12 +9686,22 @@
             <p:ph type="title"/>
           </p:nvPr>
         </p:nvSpPr>
-        <p:spPr/>
+        <p:spPr>
+          <a:xfrm>
+            <a:off x="1141413" y="101603"/>
+            <a:ext cx="9905998" cy="864973"/>
+          </a:xfrm>
+        </p:spPr>
         <p:txBody>
           <a:bodyPr/>
           <a:lstStyle/>
           <a:p>
-            <a:endParaRPr lang="en-GB"/>
+            <a:pPr algn="ctr"/>
+            <a:r>
+              <a:rPr lang="en-GB" dirty="0" smtClean="0"/>
+              <a:t>Architecture</a:t>
+            </a:r>
+            <a:endParaRPr lang="en-GB" dirty="0"/>
           </a:p>
         </p:txBody>
       </p:sp>
@@ -6497,25 +9715,81 @@
             <p:ph idx="1"/>
           </p:nvPr>
         </p:nvSpPr>
-        <p:spPr/>
+        <p:spPr>
+          <a:xfrm>
+            <a:off x="1141413" y="1474573"/>
+            <a:ext cx="9905998" cy="4316627"/>
+          </a:xfrm>
+        </p:spPr>
         <p:txBody>
           <a:bodyPr/>
           <a:lstStyle/>
           <a:p>
-            <a:endParaRPr lang="en-GB"/>
+            <a:r>
+              <a:rPr lang="en-GB" dirty="0"/>
+              <a:t>Getter and Setters</a:t>
+            </a:r>
+          </a:p>
+          <a:p>
+            <a:r>
+              <a:rPr lang="en-GB" dirty="0"/>
+              <a:t>Agent and GUI split</a:t>
+            </a:r>
+          </a:p>
+          <a:p>
+            <a:r>
+              <a:rPr lang="en-GB" dirty="0"/>
+              <a:t>OS-Specific agent implementation</a:t>
+            </a:r>
+          </a:p>
+          <a:p>
+            <a:r>
+              <a:rPr lang="en-GB" dirty="0"/>
+              <a:t>Database abstraction</a:t>
+            </a:r>
+          </a:p>
+          <a:p>
+            <a:r>
+              <a:rPr lang="en-GB" dirty="0"/>
+              <a:t>Helper classes</a:t>
+            </a:r>
+          </a:p>
+          <a:p>
+            <a:r>
+              <a:rPr lang="en-GB" dirty="0"/>
+              <a:t>Tabular GUI</a:t>
+            </a:r>
+          </a:p>
+          <a:p>
+            <a:r>
+              <a:rPr lang="en-GB" dirty="0"/>
+              <a:t>Minimal but contextual</a:t>
+            </a:r>
           </a:p>
         </p:txBody>
       </p:sp>
     </p:spTree>
     <p:extLst>
       <p:ext uri="{BB962C8B-B14F-4D97-AF65-F5344CB8AC3E}">
-        <p14:creationId xmlns:p14="http://schemas.microsoft.com/office/powerpoint/2010/main" val="3271123607"/>
+        <p14:creationId xmlns:p14="http://schemas.microsoft.com/office/powerpoint/2010/main" val="484935296"/>
       </p:ext>
     </p:extLst>
   </p:cSld>
   <p:clrMapOvr>
     <a:masterClrMapping/>
   </p:clrMapOvr>
+  <mc:AlternateContent xmlns:mc="http://schemas.openxmlformats.org/markup-compatibility/2006" xmlns:p14="http://schemas.microsoft.com/office/powerpoint/2010/main">
+    <mc:Choice Requires="p14">
+      <p:transition spd="med" p14:dur="700">
+        <p:fade/>
+      </p:transition>
+    </mc:Choice>
+    <mc:Fallback xmlns="">
+      <p:transition spd="med">
+        <p:fade/>
+      </p:transition>
+    </mc:Fallback>
+  </mc:AlternateContent>
   <p:timing>
     <p:tnLst>
       <p:par>
@@ -6553,44 +9827,77 @@
             <p:ph type="title"/>
           </p:nvPr>
         </p:nvSpPr>
-        <p:spPr/>
+        <p:spPr>
+          <a:xfrm>
+            <a:off x="1141413" y="101603"/>
+            <a:ext cx="9905998" cy="864973"/>
+          </a:xfrm>
+        </p:spPr>
         <p:txBody>
           <a:bodyPr/>
           <a:lstStyle/>
           <a:p>
-            <a:endParaRPr lang="en-GB"/>
-          </a:p>
-        </p:txBody>
-      </p:sp>
-      <p:sp>
-        <p:nvSpPr>
-          <p:cNvPr id="3" name="Content Placeholder 2"/>
-          <p:cNvSpPr>
-            <a:spLocks noGrp="1"/>
-          </p:cNvSpPr>
-          <p:nvPr>
-            <p:ph idx="1"/>
-          </p:nvPr>
-        </p:nvSpPr>
-        <p:spPr/>
-        <p:txBody>
-          <a:bodyPr/>
-          <a:lstStyle/>
-          <a:p>
-            <a:endParaRPr lang="en-GB"/>
-          </a:p>
-        </p:txBody>
-      </p:sp>
+            <a:pPr algn="ctr"/>
+            <a:r>
+              <a:rPr lang="en-GB" dirty="0" smtClean="0"/>
+              <a:t>Class Diagram</a:t>
+            </a:r>
+            <a:endParaRPr lang="en-GB" dirty="0"/>
+          </a:p>
+        </p:txBody>
+      </p:sp>
+      <p:pic>
+        <p:nvPicPr>
+          <p:cNvPr id="5" name="Content Placeholder 3"/>
+          <p:cNvPicPr>
+            <a:picLocks noChangeAspect="1"/>
+          </p:cNvPicPr>
+          <p:nvPr/>
+        </p:nvPicPr>
+        <p:blipFill>
+          <a:blip r:embed="rId2" cstate="print">
+            <a:extLst>
+              <a:ext uri="{28A0092B-C50C-407E-A947-70E740481C1C}">
+                <a14:useLocalDpi xmlns:a14="http://schemas.microsoft.com/office/drawing/2010/main" val="0"/>
+              </a:ext>
+            </a:extLst>
+          </a:blip>
+          <a:stretch>
+            <a:fillRect/>
+          </a:stretch>
+        </p:blipFill>
+        <p:spPr>
+          <a:xfrm>
+            <a:off x="967651" y="966576"/>
+            <a:ext cx="9946102" cy="5502638"/>
+          </a:xfrm>
+          <a:prstGeom prst="rect">
+            <a:avLst/>
+          </a:prstGeom>
+        </p:spPr>
+      </p:pic>
     </p:spTree>
     <p:extLst>
       <p:ext uri="{BB962C8B-B14F-4D97-AF65-F5344CB8AC3E}">
-        <p14:creationId xmlns:p14="http://schemas.microsoft.com/office/powerpoint/2010/main" val="629810459"/>
+        <p14:creationId xmlns:p14="http://schemas.microsoft.com/office/powerpoint/2010/main" val="3756056836"/>
       </p:ext>
     </p:extLst>
   </p:cSld>
   <p:clrMapOvr>
     <a:masterClrMapping/>
   </p:clrMapOvr>
+  <mc:AlternateContent xmlns:mc="http://schemas.openxmlformats.org/markup-compatibility/2006" xmlns:p14="http://schemas.microsoft.com/office/powerpoint/2010/main">
+    <mc:Choice Requires="p14">
+      <p:transition spd="med" p14:dur="700">
+        <p:fade/>
+      </p:transition>
+    </mc:Choice>
+    <mc:Fallback xmlns="">
+      <p:transition spd="med">
+        <p:fade/>
+      </p:transition>
+    </mc:Fallback>
+  </mc:AlternateContent>
   <p:timing>
     <p:tnLst>
       <p:par>

</xml_diff>

<commit_message>
Finalised versions of all documentation
</commit_message>
<xml_diff>
--- a/Presentation/PerformanceMonitorPresentation.pptx
+++ b/Presentation/PerformanceMonitorPresentation.pptx
@@ -6053,7 +6053,11 @@
           <a:p>
             <a:r>
               <a:rPr lang="en-GB" dirty="0" smtClean="0"/>
-              <a:t>Group 2 – Abubaker Egeh, Harsh Dhanwani, Martin Kukura, Niral Mehta, Romina Gnanavel, Tulga Sukhtorj</a:t>
+              <a:t>Group 2 – Abubaker Egeh, Harsh Dhanwani, Martin Kukura, Niral Mehta, Romina Gnanavel, Tulga </a:t>
+            </a:r>
+            <a:r>
+              <a:rPr lang="en-GB" smtClean="0"/>
+              <a:t>Sukhdorj</a:t>
             </a:r>
             <a:endParaRPr lang="en-GB" dirty="0"/>
           </a:p>

</xml_diff>